<commit_message>
Update 450 Final Presentation.pptx
</commit_message>
<xml_diff>
--- a/450 Final Presentation.pptx
+++ b/450 Final Presentation.pptx
@@ -6911,7 +6911,7 @@
                 <a:latin typeface="Calibri" panose="020F0502020204030204" pitchFamily="34" charset="0"/>
                 <a:cs typeface="Calibri" panose="020F0502020204030204" pitchFamily="34" charset="0"/>
               </a:rPr>
-              <a:t>What is </a:t>
+              <a:t>WHAT IS </a:t>
             </a:r>
             <a:r>
               <a:rPr lang="en-US" b="1" dirty="0">
@@ -6921,7 +6921,7 @@
                 <a:latin typeface="Calibri" panose="020F0502020204030204" pitchFamily="34" charset="0"/>
                 <a:cs typeface="Calibri" panose="020F0502020204030204" pitchFamily="34" charset="0"/>
               </a:rPr>
-              <a:t>climate Change </a:t>
+              <a:t>CLIMATE CHANGE</a:t>
             </a:r>
             <a:r>
               <a:rPr lang="en-US" dirty="0">
@@ -6958,8 +6958,8 @@
         </p:blipFill>
         <p:spPr>
           <a:xfrm>
-            <a:off x="3920737" y="1340830"/>
-            <a:ext cx="4687136" cy="3163019"/>
+            <a:off x="3545382" y="1340830"/>
+            <a:ext cx="5062491" cy="3416320"/>
           </a:xfrm>
           <a:prstGeom prst="rect">
             <a:avLst/>
@@ -6981,7 +6981,7 @@
         <p:spPr>
           <a:xfrm>
             <a:off x="536127" y="1340830"/>
-            <a:ext cx="2947131" cy="3323987"/>
+            <a:ext cx="2947131" cy="3416320"/>
           </a:xfrm>
           <a:prstGeom prst="rect">
             <a:avLst/>
@@ -6999,7 +6999,7 @@
                 <a:latin typeface="Calibri" panose="020F0502020204030204" pitchFamily="34" charset="0"/>
                 <a:cs typeface="Calibri" panose="020F0502020204030204" pitchFamily="34" charset="0"/>
               </a:rPr>
-              <a:t>Since 1850, scientists have diligently documented global surface temperatures using thermometer-based records. The data trends depict a consistent rise in temperatures, indicating a warming trend across the planet. This observed temperature increase is a clear indication of the changing climate.</a:t>
+              <a:t>Since 1850, scientists have been documented global surface temperatures using thermometer-based records. The data trends show a consistent rise in temperatures, indicating a warming trend across the planet. This increase in temperature is a clear indication of the changing climate.</a:t>
             </a:r>
           </a:p>
           <a:p>
@@ -7009,71 +7009,66 @@
             </a:endParaRPr>
           </a:p>
           <a:p>
+            <a:endParaRPr lang="en-US" sz="1200" dirty="0">
+              <a:latin typeface="Calibri" panose="020F0502020204030204" pitchFamily="34" charset="0"/>
+              <a:cs typeface="Calibri" panose="020F0502020204030204" pitchFamily="34" charset="0"/>
+            </a:endParaRPr>
+          </a:p>
+          <a:p>
+            <a:pPr marL="171450" indent="-171450">
+              <a:buFont typeface="Arial" panose="020B0604020202020204" pitchFamily="34" charset="0"/>
+              <a:buChar char="•"/>
+            </a:pPr>
             <a:r>
               <a:rPr lang="en-US" sz="1200" dirty="0">
                 <a:latin typeface="Calibri" panose="020F0502020204030204" pitchFamily="34" charset="0"/>
                 <a:cs typeface="Calibri" panose="020F0502020204030204" pitchFamily="34" charset="0"/>
               </a:rPr>
-              <a:t>This is primarily because of the emission of greenhouse gases (GHGs) such as CO</a:t>
-            </a:r>
-            <a:r>
-              <a:rPr lang="en-US" sz="1200" baseline="-25000" dirty="0">
-                <a:latin typeface="Calibri" panose="020F0502020204030204" pitchFamily="34" charset="0"/>
-                <a:cs typeface="Calibri" panose="020F0502020204030204" pitchFamily="34" charset="0"/>
-              </a:rPr>
-              <a:t>2</a:t>
-            </a:r>
+              <a:t>Greenhouse gases (GHGs) like CO2, CH4, and N2O are the primary cause.</a:t>
+            </a:r>
+          </a:p>
+          <a:p>
+            <a:pPr marL="171450" indent="-171450">
+              <a:buFont typeface="Arial" panose="020B0604020202020204" pitchFamily="34" charset="0"/>
+              <a:buChar char="•"/>
+            </a:pPr>
             <a:r>
               <a:rPr lang="en-US" sz="1200" dirty="0">
                 <a:latin typeface="Calibri" panose="020F0502020204030204" pitchFamily="34" charset="0"/>
                 <a:cs typeface="Calibri" panose="020F0502020204030204" pitchFamily="34" charset="0"/>
               </a:rPr>
-              <a:t>, CH</a:t>
-            </a:r>
-            <a:r>
-              <a:rPr lang="en-US" sz="1200" baseline="-25000" dirty="0">
-                <a:latin typeface="Calibri" panose="020F0502020204030204" pitchFamily="34" charset="0"/>
-                <a:cs typeface="Calibri" panose="020F0502020204030204" pitchFamily="34" charset="0"/>
-              </a:rPr>
-              <a:t>4</a:t>
-            </a:r>
+              <a:t>GHGs create a blanket effect in the atmosphere, trapping heat.</a:t>
+            </a:r>
+          </a:p>
+          <a:p>
+            <a:pPr marL="171450" indent="-171450">
+              <a:buFont typeface="Arial" panose="020B0604020202020204" pitchFamily="34" charset="0"/>
+              <a:buChar char="•"/>
+            </a:pPr>
             <a:r>
               <a:rPr lang="en-US" sz="1200" dirty="0">
                 <a:latin typeface="Calibri" panose="020F0502020204030204" pitchFamily="34" charset="0"/>
                 <a:cs typeface="Calibri" panose="020F0502020204030204" pitchFamily="34" charset="0"/>
               </a:rPr>
-              <a:t>, and N</a:t>
-            </a:r>
-            <a:r>
-              <a:rPr lang="en-US" sz="1200" baseline="-25000" dirty="0">
-                <a:latin typeface="Calibri" panose="020F0502020204030204" pitchFamily="34" charset="0"/>
-                <a:cs typeface="Calibri" panose="020F0502020204030204" pitchFamily="34" charset="0"/>
-              </a:rPr>
-              <a:t>2</a:t>
-            </a:r>
+              <a:t>Result: Earth's temperature increases.</a:t>
+            </a:r>
+          </a:p>
+          <a:p>
+            <a:pPr marL="171450" indent="-171450">
+              <a:buFont typeface="Arial" panose="020B0604020202020204" pitchFamily="34" charset="0"/>
+              <a:buChar char="•"/>
+            </a:pPr>
             <a:r>
               <a:rPr lang="en-US" sz="1200" dirty="0">
                 <a:latin typeface="Calibri" panose="020F0502020204030204" pitchFamily="34" charset="0"/>
                 <a:cs typeface="Calibri" panose="020F0502020204030204" pitchFamily="34" charset="0"/>
               </a:rPr>
-              <a:t>O. These GHGs act as a blanket in the Earth's atmosphere, trapping heat and causing the Earth's temperature to rise. </a:t>
-            </a:r>
-          </a:p>
-          <a:p>
-            <a:r>
-              <a:rPr lang="en-US" sz="1200" dirty="0">
-                <a:latin typeface="Calibri" panose="020F0502020204030204" pitchFamily="34" charset="0"/>
-                <a:cs typeface="Calibri" panose="020F0502020204030204" pitchFamily="34" charset="0"/>
-              </a:rPr>
-              <a:t>This increase in temperature can result in extreme weather events, rising sea levels, and disruptions to ecosystems</a:t>
-            </a:r>
-            <a:r>
-              <a:rPr lang="en-US" dirty="0">
-                <a:latin typeface="Calibri" panose="020F0502020204030204" pitchFamily="34" charset="0"/>
-                <a:cs typeface="Calibri" panose="020F0502020204030204" pitchFamily="34" charset="0"/>
-              </a:rPr>
-              <a:t>.</a:t>
-            </a:r>
+              <a:t>Consequences: Extreme weather events, rising sea levels, and disruptions in ecosystems.</a:t>
+            </a:r>
+            <a:endParaRPr lang="en-US" dirty="0">
+              <a:latin typeface="Calibri" panose="020F0502020204030204" pitchFamily="34" charset="0"/>
+              <a:cs typeface="Calibri" panose="020F0502020204030204" pitchFamily="34" charset="0"/>
+            </a:endParaRPr>
           </a:p>
         </p:txBody>
       </p:sp>
@@ -7179,7 +7174,7 @@
                 <a:latin typeface="Calibri" panose="020F0502020204030204" pitchFamily="34" charset="0"/>
                 <a:cs typeface="Calibri" panose="020F0502020204030204" pitchFamily="34" charset="0"/>
               </a:rPr>
-              <a:t>Why is It </a:t>
+              <a:t>WHY IS IT </a:t>
             </a:r>
             <a:r>
               <a:rPr lang="en-US" b="1" dirty="0">
@@ -7189,7 +7184,7 @@
                 <a:latin typeface="Calibri" panose="020F0502020204030204" pitchFamily="34" charset="0"/>
                 <a:cs typeface="Calibri" panose="020F0502020204030204" pitchFamily="34" charset="0"/>
               </a:rPr>
-              <a:t>a problem</a:t>
+              <a:t>A PROBLEM</a:t>
             </a:r>
             <a:r>
               <a:rPr lang="en-US" dirty="0">
@@ -7219,7 +7214,7 @@
         <p:spPr>
           <a:xfrm>
             <a:off x="513115" y="717084"/>
-            <a:ext cx="8117767" cy="1169551"/>
+            <a:ext cx="8117767" cy="954107"/>
           </a:xfrm>
           <a:prstGeom prst="rect">
             <a:avLst/>
@@ -7237,7 +7232,7 @@
                 <a:latin typeface="Calibri" panose="020F0502020204030204" pitchFamily="34" charset="0"/>
                 <a:cs typeface="Calibri" panose="020F0502020204030204" pitchFamily="34" charset="0"/>
               </a:rPr>
-              <a:t>Over the course of millions of years, species undergo gradual adaptations to survive within their specific environmental conditions. A stable climate is vital for this intricate process, fostering an environment where life forms can flourish and evolve. However, when the climate undergoes rapid changes, organisms face a challenge: the limited time available for adaptation to new conditions. Consequently, these swift alterations may render certain species unable to cope, threatening their survival in the changed environment.</a:t>
+              <a:t>Species evolve slowly over millions of years to thrive in their unique environments. A stable climate supports this by allowing life to prosper and adapt. But rapid climate changes present a challenge: organisms have limited time to adapt. Swift alterations can leave some species struggling to survive, putting their existence at risk in the new environment.</a:t>
             </a:r>
           </a:p>
         </p:txBody>
@@ -7488,8 +7483,8 @@
         </p:blipFill>
         <p:spPr>
           <a:xfrm>
-            <a:off x="2154429" y="1891666"/>
-            <a:ext cx="4835137" cy="2584528"/>
+            <a:off x="1873851" y="1800843"/>
+            <a:ext cx="5396293" cy="2884483"/>
           </a:xfrm>
           <a:prstGeom prst="rect">
             <a:avLst/>
@@ -7593,27 +7588,29 @@
           <a:lstStyle/>
           <a:p>
             <a:r>
-              <a:rPr lang="en-US" sz="1600" dirty="0" err="1">
+              <a:rPr lang="en-US" sz="1600" dirty="0">
+                <a:solidFill>
+                  <a:schemeClr val="tx1"/>
+                </a:solidFill>
                 <a:latin typeface="Calibri" panose="020F0502020204030204" pitchFamily="34" charset="0"/>
                 <a:cs typeface="Calibri" panose="020F0502020204030204" pitchFamily="34" charset="0"/>
               </a:rPr>
-              <a:t>Bla</a:t>
-            </a:r>
-            <a:r>
-              <a:rPr lang="en-US" sz="1600" dirty="0">
+              <a:t>There has been a lot of flooding and landslide increasing with </a:t>
+            </a:r>
+            <a:r>
+              <a:rPr lang="en-US" sz="1600">
+                <a:solidFill>
+                  <a:schemeClr val="tx1"/>
+                </a:solidFill>
                 <a:latin typeface="Calibri" panose="020F0502020204030204" pitchFamily="34" charset="0"/>
                 <a:cs typeface="Calibri" panose="020F0502020204030204" pitchFamily="34" charset="0"/>
               </a:rPr>
-              <a:t> </a:t>
-            </a:r>
-            <a:r>
-              <a:rPr lang="en-US" sz="1600" dirty="0" err="1">
-                <a:latin typeface="Calibri" panose="020F0502020204030204" pitchFamily="34" charset="0"/>
-                <a:cs typeface="Calibri" panose="020F0502020204030204" pitchFamily="34" charset="0"/>
-              </a:rPr>
-              <a:t>Bla</a:t>
+              <a:t>temperature rise</a:t>
             </a:r>
             <a:endParaRPr lang="en-US" sz="1600" dirty="0">
+              <a:solidFill>
+                <a:schemeClr val="tx1"/>
+              </a:solidFill>
               <a:latin typeface="Calibri" panose="020F0502020204030204" pitchFamily="34" charset="0"/>
               <a:cs typeface="Calibri" panose="020F0502020204030204" pitchFamily="34" charset="0"/>
             </a:endParaRPr>
@@ -7806,7 +7803,7 @@
         </p:blipFill>
         <p:spPr>
           <a:xfrm>
-            <a:off x="1855114" y="1752709"/>
+            <a:off x="1855114" y="2085002"/>
             <a:ext cx="5144322" cy="2749797"/>
           </a:xfrm>
           <a:prstGeom prst="rect">

</xml_diff>

<commit_message>
add new updated pic, and make changes the presentation
</commit_message>
<xml_diff>
--- a/450 Final Presentation.pptx
+++ b/450 Final Presentation.pptx
@@ -5,16 +5,20 @@
     <p:sldMasterId id="2147483723" r:id="rId1"/>
   </p:sldMasterIdLst>
   <p:notesMasterIdLst>
-    <p:notesMasterId r:id="rId9"/>
+    <p:notesMasterId r:id="rId13"/>
   </p:notesMasterIdLst>
   <p:sldIdLst>
     <p:sldId id="298" r:id="rId2"/>
     <p:sldId id="257" r:id="rId3"/>
-    <p:sldId id="258" r:id="rId4"/>
+    <p:sldId id="305" r:id="rId4"/>
     <p:sldId id="259" r:id="rId5"/>
     <p:sldId id="260" r:id="rId6"/>
-    <p:sldId id="301" r:id="rId7"/>
-    <p:sldId id="299" r:id="rId8"/>
+    <p:sldId id="258" r:id="rId7"/>
+    <p:sldId id="306" r:id="rId8"/>
+    <p:sldId id="302" r:id="rId9"/>
+    <p:sldId id="303" r:id="rId10"/>
+    <p:sldId id="301" r:id="rId11"/>
+    <p:sldId id="299" r:id="rId12"/>
   </p:sldIdLst>
   <p:sldSz cx="9144000" cy="5143500" type="screen16x9"/>
   <p:notesSz cx="6858000" cy="9144000"/>
@@ -6860,6 +6864,387 @@
 </p:sld>
 </file>
 
+<file path=ppt/slides/slide10.xml><?xml version="1.0" encoding="utf-8"?>
+<p:sld xmlns:a="http://schemas.openxmlformats.org/drawingml/2006/main" xmlns:r="http://schemas.openxmlformats.org/officeDocument/2006/relationships" xmlns:p="http://schemas.openxmlformats.org/presentationml/2006/main">
+  <p:cSld>
+    <p:spTree>
+      <p:nvGrpSpPr>
+        <p:cNvPr id="1" name=""/>
+        <p:cNvGrpSpPr/>
+        <p:nvPr/>
+      </p:nvGrpSpPr>
+      <p:grpSpPr>
+        <a:xfrm>
+          <a:off x="0" y="0"/>
+          <a:ext cx="0" cy="0"/>
+          <a:chOff x="0" y="0"/>
+          <a:chExt cx="0" cy="0"/>
+        </a:xfrm>
+      </p:grpSpPr>
+      <p:sp>
+        <p:nvSpPr>
+          <p:cNvPr id="3" name="Title 1">
+            <a:extLst>
+              <a:ext uri="{FF2B5EF4-FFF2-40B4-BE49-F238E27FC236}">
+                <a16:creationId xmlns:a16="http://schemas.microsoft.com/office/drawing/2014/main" id="{00CF155C-47C5-C9EE-AFA4-A221A26BA7DB}"/>
+              </a:ext>
+            </a:extLst>
+          </p:cNvPr>
+          <p:cNvSpPr txBox="1">
+            <a:spLocks/>
+          </p:cNvSpPr>
+          <p:nvPr/>
+        </p:nvSpPr>
+        <p:spPr>
+          <a:xfrm>
+            <a:off x="311700" y="0"/>
+            <a:ext cx="8520600" cy="841800"/>
+          </a:xfrm>
+          <a:prstGeom prst="rect">
+            <a:avLst/>
+          </a:prstGeom>
+        </p:spPr>
+        <p:txBody>
+          <a:bodyPr spcFirstLastPara="1" vert="horz" wrap="square" lIns="91425" tIns="91425" rIns="91425" bIns="91425" rtlCol="0" anchor="ctr" anchorCtr="0">
+            <a:normAutofit/>
+          </a:bodyPr>
+          <a:lstStyle>
+            <a:lvl1pPr lvl="0" algn="ctr" defTabSz="685800" rtl="0" eaLnBrk="1" latinLnBrk="0" hangingPunct="1">
+              <a:lnSpc>
+                <a:spcPct val="90000"/>
+              </a:lnSpc>
+              <a:spcBef>
+                <a:spcPts val="0"/>
+              </a:spcBef>
+              <a:spcAft>
+                <a:spcPts val="0"/>
+              </a:spcAft>
+              <a:buSzPts val="3600"/>
+              <a:buNone/>
+              <a:defRPr sz="3600" b="0" i="0" kern="1200" cap="all">
+                <a:solidFill>
+                  <a:schemeClr val="tx1"/>
+                </a:solidFill>
+                <a:effectLst/>
+                <a:latin typeface="+mj-lt"/>
+                <a:ea typeface="+mj-ea"/>
+                <a:cs typeface="+mj-cs"/>
+              </a:defRPr>
+            </a:lvl1pPr>
+            <a:lvl2pPr lvl="1" algn="ctr">
+              <a:spcBef>
+                <a:spcPts val="0"/>
+              </a:spcBef>
+              <a:spcAft>
+                <a:spcPts val="0"/>
+              </a:spcAft>
+              <a:buSzPts val="3600"/>
+              <a:buNone/>
+              <a:defRPr sz="3600"/>
+            </a:lvl2pPr>
+            <a:lvl3pPr lvl="2" algn="ctr">
+              <a:spcBef>
+                <a:spcPts val="0"/>
+              </a:spcBef>
+              <a:spcAft>
+                <a:spcPts val="0"/>
+              </a:spcAft>
+              <a:buSzPts val="3600"/>
+              <a:buNone/>
+              <a:defRPr sz="3600"/>
+            </a:lvl3pPr>
+            <a:lvl4pPr lvl="3" algn="ctr">
+              <a:spcBef>
+                <a:spcPts val="0"/>
+              </a:spcBef>
+              <a:spcAft>
+                <a:spcPts val="0"/>
+              </a:spcAft>
+              <a:buSzPts val="3600"/>
+              <a:buNone/>
+              <a:defRPr sz="3600"/>
+            </a:lvl4pPr>
+            <a:lvl5pPr lvl="4" algn="ctr">
+              <a:spcBef>
+                <a:spcPts val="0"/>
+              </a:spcBef>
+              <a:spcAft>
+                <a:spcPts val="0"/>
+              </a:spcAft>
+              <a:buSzPts val="3600"/>
+              <a:buNone/>
+              <a:defRPr sz="3600"/>
+            </a:lvl5pPr>
+            <a:lvl6pPr lvl="5" algn="ctr">
+              <a:spcBef>
+                <a:spcPts val="0"/>
+              </a:spcBef>
+              <a:spcAft>
+                <a:spcPts val="0"/>
+              </a:spcAft>
+              <a:buSzPts val="3600"/>
+              <a:buNone/>
+              <a:defRPr sz="3600"/>
+            </a:lvl6pPr>
+            <a:lvl7pPr lvl="6" algn="ctr">
+              <a:spcBef>
+                <a:spcPts val="0"/>
+              </a:spcBef>
+              <a:spcAft>
+                <a:spcPts val="0"/>
+              </a:spcAft>
+              <a:buSzPts val="3600"/>
+              <a:buNone/>
+              <a:defRPr sz="3600"/>
+            </a:lvl7pPr>
+            <a:lvl8pPr lvl="7" algn="ctr">
+              <a:spcBef>
+                <a:spcPts val="0"/>
+              </a:spcBef>
+              <a:spcAft>
+                <a:spcPts val="0"/>
+              </a:spcAft>
+              <a:buSzPts val="3600"/>
+              <a:buNone/>
+              <a:defRPr sz="3600"/>
+            </a:lvl8pPr>
+            <a:lvl9pPr lvl="8" algn="ctr">
+              <a:spcBef>
+                <a:spcPts val="0"/>
+              </a:spcBef>
+              <a:spcAft>
+                <a:spcPts val="0"/>
+              </a:spcAft>
+              <a:buSzPts val="3600"/>
+              <a:buNone/>
+              <a:defRPr sz="3600"/>
+            </a:lvl9pPr>
+          </a:lstStyle>
+          <a:p>
+            <a:r>
+              <a:rPr lang="en-US" dirty="0">
+                <a:latin typeface="Calibri" panose="020F0502020204030204" pitchFamily="34" charset="0"/>
+                <a:cs typeface="Calibri" panose="020F0502020204030204" pitchFamily="34" charset="0"/>
+              </a:rPr>
+              <a:t>Why is It </a:t>
+            </a:r>
+            <a:r>
+              <a:rPr lang="en-US" b="1" dirty="0">
+                <a:latin typeface="Calibri" panose="020F0502020204030204" pitchFamily="34" charset="0"/>
+                <a:cs typeface="Calibri" panose="020F0502020204030204" pitchFamily="34" charset="0"/>
+              </a:rPr>
+              <a:t>a problem</a:t>
+            </a:r>
+            <a:r>
+              <a:rPr lang="en-US" dirty="0">
+                <a:latin typeface="Calibri" panose="020F0502020204030204" pitchFamily="34" charset="0"/>
+                <a:cs typeface="Calibri" panose="020F0502020204030204" pitchFamily="34" charset="0"/>
+              </a:rPr>
+              <a:t>?</a:t>
+            </a:r>
+          </a:p>
+        </p:txBody>
+      </p:sp>
+      <p:pic>
+        <p:nvPicPr>
+          <p:cNvPr id="5" name="Picture 4">
+            <a:extLst>
+              <a:ext uri="{FF2B5EF4-FFF2-40B4-BE49-F238E27FC236}">
+                <a16:creationId xmlns:a16="http://schemas.microsoft.com/office/drawing/2014/main" id="{0B072DDD-7D1D-E810-ADF6-183189B75289}"/>
+              </a:ext>
+            </a:extLst>
+          </p:cNvPr>
+          <p:cNvPicPr>
+            <a:picLocks noChangeAspect="1"/>
+          </p:cNvPicPr>
+          <p:nvPr/>
+        </p:nvPicPr>
+        <p:blipFill>
+          <a:blip r:embed="rId2"/>
+          <a:stretch>
+            <a:fillRect/>
+          </a:stretch>
+        </p:blipFill>
+        <p:spPr>
+          <a:xfrm>
+            <a:off x="311700" y="567069"/>
+            <a:ext cx="5346298" cy="4576431"/>
+          </a:xfrm>
+          <a:prstGeom prst="rect">
+            <a:avLst/>
+          </a:prstGeom>
+        </p:spPr>
+      </p:pic>
+    </p:spTree>
+    <p:extLst>
+      <p:ext uri="{BB962C8B-B14F-4D97-AF65-F5344CB8AC3E}">
+        <p14:creationId xmlns:p14="http://schemas.microsoft.com/office/powerpoint/2010/main" val="125542913"/>
+      </p:ext>
+    </p:extLst>
+  </p:cSld>
+  <p:clrMapOvr>
+    <a:masterClrMapping/>
+  </p:clrMapOvr>
+</p:sld>
+</file>
+
+<file path=ppt/slides/slide11.xml><?xml version="1.0" encoding="utf-8"?>
+<p:sld xmlns:a="http://schemas.openxmlformats.org/drawingml/2006/main" xmlns:r="http://schemas.openxmlformats.org/officeDocument/2006/relationships" xmlns:p="http://schemas.openxmlformats.org/presentationml/2006/main">
+  <p:cSld>
+    <p:spTree>
+      <p:nvGrpSpPr>
+        <p:cNvPr id="1" name=""/>
+        <p:cNvGrpSpPr/>
+        <p:nvPr/>
+      </p:nvGrpSpPr>
+      <p:grpSpPr>
+        <a:xfrm>
+          <a:off x="0" y="0"/>
+          <a:ext cx="0" cy="0"/>
+          <a:chOff x="0" y="0"/>
+          <a:chExt cx="0" cy="0"/>
+        </a:xfrm>
+      </p:grpSpPr>
+      <p:sp>
+        <p:nvSpPr>
+          <p:cNvPr id="2" name="Title 1">
+            <a:extLst>
+              <a:ext uri="{FF2B5EF4-FFF2-40B4-BE49-F238E27FC236}">
+                <a16:creationId xmlns:a16="http://schemas.microsoft.com/office/drawing/2014/main" id="{203E8EEB-CC68-9AC1-165A-9B6F30EBD7CC}"/>
+              </a:ext>
+            </a:extLst>
+          </p:cNvPr>
+          <p:cNvSpPr>
+            <a:spLocks noGrp="1"/>
+          </p:cNvSpPr>
+          <p:nvPr>
+            <p:ph type="title"/>
+          </p:nvPr>
+        </p:nvSpPr>
+        <p:spPr>
+          <a:xfrm>
+            <a:off x="311700" y="0"/>
+            <a:ext cx="8520600" cy="841800"/>
+          </a:xfrm>
+        </p:spPr>
+        <p:txBody>
+          <a:bodyPr/>
+          <a:lstStyle/>
+          <a:p>
+            <a:r>
+              <a:rPr lang="en-US" dirty="0">
+                <a:solidFill>
+                  <a:schemeClr val="tx1"/>
+                </a:solidFill>
+                <a:latin typeface="Calibri" panose="020F0502020204030204" pitchFamily="34" charset="0"/>
+                <a:cs typeface="Calibri" panose="020F0502020204030204" pitchFamily="34" charset="0"/>
+              </a:rPr>
+              <a:t>Who Causes </a:t>
+            </a:r>
+            <a:r>
+              <a:rPr lang="en-US" b="1" dirty="0">
+                <a:solidFill>
+                  <a:schemeClr val="tx1"/>
+                </a:solidFill>
+                <a:latin typeface="Calibri" panose="020F0502020204030204" pitchFamily="34" charset="0"/>
+                <a:cs typeface="Calibri" panose="020F0502020204030204" pitchFamily="34" charset="0"/>
+              </a:rPr>
+              <a:t>Climate Change</a:t>
+            </a:r>
+            <a:r>
+              <a:rPr lang="en-US" dirty="0">
+                <a:solidFill>
+                  <a:schemeClr val="tx1"/>
+                </a:solidFill>
+                <a:latin typeface="Calibri" panose="020F0502020204030204" pitchFamily="34" charset="0"/>
+                <a:cs typeface="Calibri" panose="020F0502020204030204" pitchFamily="34" charset="0"/>
+              </a:rPr>
+              <a:t>?</a:t>
+            </a:r>
+          </a:p>
+        </p:txBody>
+      </p:sp>
+      <p:sp>
+        <p:nvSpPr>
+          <p:cNvPr id="3" name="TextBox 2">
+            <a:extLst>
+              <a:ext uri="{FF2B5EF4-FFF2-40B4-BE49-F238E27FC236}">
+                <a16:creationId xmlns:a16="http://schemas.microsoft.com/office/drawing/2014/main" id="{7230E5A1-E0B8-34C1-BB0A-6B72CE05C953}"/>
+              </a:ext>
+            </a:extLst>
+          </p:cNvPr>
+          <p:cNvSpPr txBox="1"/>
+          <p:nvPr/>
+        </p:nvSpPr>
+        <p:spPr>
+          <a:xfrm>
+            <a:off x="179349" y="1553591"/>
+            <a:ext cx="3295787" cy="2062103"/>
+          </a:xfrm>
+          <a:prstGeom prst="rect">
+            <a:avLst/>
+          </a:prstGeom>
+          <a:noFill/>
+        </p:spPr>
+        <p:txBody>
+          <a:bodyPr wrap="square" rtlCol="0">
+            <a:spAutoFit/>
+          </a:bodyPr>
+          <a:lstStyle/>
+          <a:p>
+            <a:r>
+              <a:rPr lang="en-US" sz="1600" dirty="0">
+                <a:latin typeface="Calibri" panose="020F0502020204030204" pitchFamily="34" charset="0"/>
+                <a:cs typeface="Calibri" panose="020F0502020204030204" pitchFamily="34" charset="0"/>
+              </a:rPr>
+              <a:t>It is estimated that around 1% of greenhouse gases in the question of global warming are said to originate from the 50 most less-developed countries. On the other hand, inputs by the U.S, EU, and China accumulate about 60% of the World’s CO2 Emission.</a:t>
+            </a:r>
+          </a:p>
+        </p:txBody>
+      </p:sp>
+      <p:pic>
+        <p:nvPicPr>
+          <p:cNvPr id="5" name="Picture 4">
+            <a:extLst>
+              <a:ext uri="{FF2B5EF4-FFF2-40B4-BE49-F238E27FC236}">
+                <a16:creationId xmlns:a16="http://schemas.microsoft.com/office/drawing/2014/main" id="{DCEE3AC7-4E5E-342E-546E-A44F911EFD86}"/>
+              </a:ext>
+            </a:extLst>
+          </p:cNvPr>
+          <p:cNvPicPr>
+            <a:picLocks noChangeAspect="1"/>
+          </p:cNvPicPr>
+          <p:nvPr/>
+        </p:nvPicPr>
+        <p:blipFill>
+          <a:blip r:embed="rId2"/>
+          <a:stretch>
+            <a:fillRect/>
+          </a:stretch>
+        </p:blipFill>
+        <p:spPr>
+          <a:xfrm>
+            <a:off x="3475136" y="790732"/>
+            <a:ext cx="4570268" cy="3852809"/>
+          </a:xfrm>
+          <a:prstGeom prst="rect">
+            <a:avLst/>
+          </a:prstGeom>
+        </p:spPr>
+      </p:pic>
+    </p:spTree>
+    <p:extLst>
+      <p:ext uri="{BB962C8B-B14F-4D97-AF65-F5344CB8AC3E}">
+        <p14:creationId xmlns:p14="http://schemas.microsoft.com/office/powerpoint/2010/main" val="1975145425"/>
+      </p:ext>
+    </p:extLst>
+  </p:cSld>
+  <p:clrMapOvr>
+    <a:masterClrMapping/>
+  </p:clrMapOvr>
+</p:sld>
+</file>
+
 <file path=ppt/slides/slide2.xml><?xml version="1.0" encoding="utf-8"?>
 <p:sld xmlns:a="http://schemas.openxmlformats.org/drawingml/2006/main" xmlns:r="http://schemas.openxmlformats.org/officeDocument/2006/relationships" xmlns:p="http://schemas.openxmlformats.org/presentationml/2006/main">
   <p:cSld>
@@ -6980,8 +7365,8 @@
         </p:nvSpPr>
         <p:spPr>
           <a:xfrm>
-            <a:off x="536127" y="1340830"/>
-            <a:ext cx="2947131" cy="3416320"/>
+            <a:off x="536127" y="1525496"/>
+            <a:ext cx="2947131" cy="3046988"/>
           </a:xfrm>
           <a:prstGeom prst="rect">
             <a:avLst/>
@@ -6999,14 +7384,8 @@
                 <a:latin typeface="Calibri" panose="020F0502020204030204" pitchFamily="34" charset="0"/>
                 <a:cs typeface="Calibri" panose="020F0502020204030204" pitchFamily="34" charset="0"/>
               </a:rPr>
-              <a:t>Since 1850, scientists have been documented global surface temperatures using thermometer-based records. The data trends show a consistent rise in temperatures, indicating a warming trend across the planet. This increase in temperature is a clear indication of the changing climate.</a:t>
-            </a:r>
-          </a:p>
-          <a:p>
-            <a:endParaRPr lang="en-US" sz="1200" dirty="0">
-              <a:latin typeface="Calibri" panose="020F0502020204030204" pitchFamily="34" charset="0"/>
-              <a:cs typeface="Calibri" panose="020F0502020204030204" pitchFamily="34" charset="0"/>
-            </a:endParaRPr>
+              <a:t>These have been recorded since 1850 in various parts of the world by means of thermometer-based records. There is a clear upward trend in terms of temperature data across the globe suggesting warming trend. The rising temperatures represent an evident sign of climate change.</a:t>
+            </a:r>
           </a:p>
           <a:p>
             <a:endParaRPr lang="en-US" sz="1200" dirty="0">
@@ -7232,7 +7611,718 @@
                 <a:latin typeface="Calibri" panose="020F0502020204030204" pitchFamily="34" charset="0"/>
                 <a:cs typeface="Calibri" panose="020F0502020204030204" pitchFamily="34" charset="0"/>
               </a:rPr>
-              <a:t>Species evolve slowly over millions of years to thrive in their unique environments. A stable climate supports this by allowing life to prosper and adapt. But rapid climate changes present a challenge: organisms have limited time to adapt. Swift alterations can leave some species struggling to survive, putting their existence at risk in the new environment.</a:t>
+              <a:t>Over a long period of time species adapt gradually to fit well with their environment. This is supported by a stable climate that facilitates growth and adaptation of life. But rapid climate changes present a challenge: this implies that, organism has very short time for adaptation. Such rapid changes may sometimes prove hard for certain species to adapt with and consequently threaten them existence in a new surroundings.</a:t>
+            </a:r>
+          </a:p>
+        </p:txBody>
+      </p:sp>
+      <p:pic>
+        <p:nvPicPr>
+          <p:cNvPr id="1026" name="Picture 2" descr="Habitat Loss Threatens Planet's Stability – The Prowl">
+            <a:extLst>
+              <a:ext uri="{FF2B5EF4-FFF2-40B4-BE49-F238E27FC236}">
+                <a16:creationId xmlns:a16="http://schemas.microsoft.com/office/drawing/2014/main" id="{57A3693C-A0B9-D15B-4D13-B3E78D767F9E}"/>
+              </a:ext>
+            </a:extLst>
+          </p:cNvPr>
+          <p:cNvPicPr>
+            <a:picLocks noChangeAspect="1" noChangeArrowheads="1"/>
+          </p:cNvPicPr>
+          <p:nvPr/>
+        </p:nvPicPr>
+        <p:blipFill>
+          <a:blip r:embed="rId2">
+            <a:extLst>
+              <a:ext uri="{28A0092B-C50C-407E-A947-70E740481C1C}">
+                <a14:useLocalDpi xmlns:a14="http://schemas.microsoft.com/office/drawing/2010/main" val="0"/>
+              </a:ext>
+            </a:extLst>
+          </a:blip>
+          <a:srcRect/>
+          <a:stretch>
+            <a:fillRect/>
+          </a:stretch>
+        </p:blipFill>
+        <p:spPr bwMode="auto">
+          <a:xfrm>
+            <a:off x="2402271" y="1930349"/>
+            <a:ext cx="4339458" cy="2878756"/>
+          </a:xfrm>
+          <a:prstGeom prst="rect">
+            <a:avLst/>
+          </a:prstGeom>
+          <a:noFill/>
+          <a:extLst>
+            <a:ext uri="{909E8E84-426E-40DD-AFC4-6F175D3DCCD1}">
+              <a14:hiddenFill xmlns:a14="http://schemas.microsoft.com/office/drawing/2010/main">
+                <a:solidFill>
+                  <a:srgbClr val="FFFFFF"/>
+                </a:solidFill>
+              </a14:hiddenFill>
+            </a:ext>
+          </a:extLst>
+        </p:spPr>
+      </p:pic>
+    </p:spTree>
+    <p:extLst>
+      <p:ext uri="{BB962C8B-B14F-4D97-AF65-F5344CB8AC3E}">
+        <p14:creationId xmlns:p14="http://schemas.microsoft.com/office/powerpoint/2010/main" val="4099967484"/>
+      </p:ext>
+    </p:extLst>
+  </p:cSld>
+  <p:clrMapOvr>
+    <a:masterClrMapping/>
+  </p:clrMapOvr>
+</p:sld>
+</file>
+
+<file path=ppt/slides/slide4.xml><?xml version="1.0" encoding="utf-8"?>
+<p:sld xmlns:a="http://schemas.openxmlformats.org/drawingml/2006/main" xmlns:r="http://schemas.openxmlformats.org/officeDocument/2006/relationships" xmlns:p="http://schemas.openxmlformats.org/presentationml/2006/main">
+  <p:cSld>
+    <p:spTree>
+      <p:nvGrpSpPr>
+        <p:cNvPr id="1" name=""/>
+        <p:cNvGrpSpPr/>
+        <p:nvPr/>
+      </p:nvGrpSpPr>
+      <p:grpSpPr>
+        <a:xfrm>
+          <a:off x="0" y="0"/>
+          <a:ext cx="0" cy="0"/>
+          <a:chOff x="0" y="0"/>
+          <a:chExt cx="0" cy="0"/>
+        </a:xfrm>
+      </p:grpSpPr>
+      <p:sp>
+        <p:nvSpPr>
+          <p:cNvPr id="3" name="Title 1">
+            <a:extLst>
+              <a:ext uri="{FF2B5EF4-FFF2-40B4-BE49-F238E27FC236}">
+                <a16:creationId xmlns:a16="http://schemas.microsoft.com/office/drawing/2014/main" id="{5645BF0C-628B-3C34-93B2-1752868A6DE2}"/>
+              </a:ext>
+            </a:extLst>
+          </p:cNvPr>
+          <p:cNvSpPr txBox="1">
+            <a:spLocks/>
+          </p:cNvSpPr>
+          <p:nvPr/>
+        </p:nvSpPr>
+        <p:spPr>
+          <a:xfrm>
+            <a:off x="311700" y="0"/>
+            <a:ext cx="8520600" cy="841800"/>
+          </a:xfrm>
+          <a:prstGeom prst="rect">
+            <a:avLst/>
+          </a:prstGeom>
+        </p:spPr>
+        <p:txBody>
+          <a:bodyPr spcFirstLastPara="1" vert="horz" wrap="square" lIns="91425" tIns="91425" rIns="91425" bIns="91425" rtlCol="0" anchor="ctr" anchorCtr="0">
+            <a:normAutofit/>
+          </a:bodyPr>
+          <a:lstStyle>
+            <a:lvl1pPr lvl="0" algn="ctr" defTabSz="685800" rtl="0" eaLnBrk="1" latinLnBrk="0" hangingPunct="1">
+              <a:lnSpc>
+                <a:spcPct val="90000"/>
+              </a:lnSpc>
+              <a:spcBef>
+                <a:spcPts val="0"/>
+              </a:spcBef>
+              <a:spcAft>
+                <a:spcPts val="0"/>
+              </a:spcAft>
+              <a:buSzPts val="3600"/>
+              <a:buNone/>
+              <a:defRPr sz="3600" b="0" i="0" kern="1200" cap="all">
+                <a:solidFill>
+                  <a:schemeClr val="tx1"/>
+                </a:solidFill>
+                <a:effectLst/>
+                <a:latin typeface="+mj-lt"/>
+                <a:ea typeface="+mj-ea"/>
+                <a:cs typeface="+mj-cs"/>
+              </a:defRPr>
+            </a:lvl1pPr>
+            <a:lvl2pPr lvl="1" algn="ctr">
+              <a:spcBef>
+                <a:spcPts val="0"/>
+              </a:spcBef>
+              <a:spcAft>
+                <a:spcPts val="0"/>
+              </a:spcAft>
+              <a:buSzPts val="3600"/>
+              <a:buNone/>
+              <a:defRPr sz="3600"/>
+            </a:lvl2pPr>
+            <a:lvl3pPr lvl="2" algn="ctr">
+              <a:spcBef>
+                <a:spcPts val="0"/>
+              </a:spcBef>
+              <a:spcAft>
+                <a:spcPts val="0"/>
+              </a:spcAft>
+              <a:buSzPts val="3600"/>
+              <a:buNone/>
+              <a:defRPr sz="3600"/>
+            </a:lvl3pPr>
+            <a:lvl4pPr lvl="3" algn="ctr">
+              <a:spcBef>
+                <a:spcPts val="0"/>
+              </a:spcBef>
+              <a:spcAft>
+                <a:spcPts val="0"/>
+              </a:spcAft>
+              <a:buSzPts val="3600"/>
+              <a:buNone/>
+              <a:defRPr sz="3600"/>
+            </a:lvl4pPr>
+            <a:lvl5pPr lvl="4" algn="ctr">
+              <a:spcBef>
+                <a:spcPts val="0"/>
+              </a:spcBef>
+              <a:spcAft>
+                <a:spcPts val="0"/>
+              </a:spcAft>
+              <a:buSzPts val="3600"/>
+              <a:buNone/>
+              <a:defRPr sz="3600"/>
+            </a:lvl5pPr>
+            <a:lvl6pPr lvl="5" algn="ctr">
+              <a:spcBef>
+                <a:spcPts val="0"/>
+              </a:spcBef>
+              <a:spcAft>
+                <a:spcPts val="0"/>
+              </a:spcAft>
+              <a:buSzPts val="3600"/>
+              <a:buNone/>
+              <a:defRPr sz="3600"/>
+            </a:lvl6pPr>
+            <a:lvl7pPr lvl="6" algn="ctr">
+              <a:spcBef>
+                <a:spcPts val="0"/>
+              </a:spcBef>
+              <a:spcAft>
+                <a:spcPts val="0"/>
+              </a:spcAft>
+              <a:buSzPts val="3600"/>
+              <a:buNone/>
+              <a:defRPr sz="3600"/>
+            </a:lvl7pPr>
+            <a:lvl8pPr lvl="7" algn="ctr">
+              <a:spcBef>
+                <a:spcPts val="0"/>
+              </a:spcBef>
+              <a:spcAft>
+                <a:spcPts val="0"/>
+              </a:spcAft>
+              <a:buSzPts val="3600"/>
+              <a:buNone/>
+              <a:defRPr sz="3600"/>
+            </a:lvl8pPr>
+            <a:lvl9pPr lvl="8" algn="ctr">
+              <a:spcBef>
+                <a:spcPts val="0"/>
+              </a:spcBef>
+              <a:spcAft>
+                <a:spcPts val="0"/>
+              </a:spcAft>
+              <a:buSzPts val="3600"/>
+              <a:buNone/>
+              <a:defRPr sz="3600"/>
+            </a:lvl9pPr>
+          </a:lstStyle>
+          <a:p>
+            <a:r>
+              <a:rPr lang="en-US" dirty="0">
+                <a:latin typeface="Calibri" panose="020F0502020204030204" pitchFamily="34" charset="0"/>
+                <a:cs typeface="Calibri" panose="020F0502020204030204" pitchFamily="34" charset="0"/>
+              </a:rPr>
+              <a:t>Why is It </a:t>
+            </a:r>
+            <a:r>
+              <a:rPr lang="en-US" b="1" dirty="0">
+                <a:latin typeface="Calibri" panose="020F0502020204030204" pitchFamily="34" charset="0"/>
+                <a:cs typeface="Calibri" panose="020F0502020204030204" pitchFamily="34" charset="0"/>
+              </a:rPr>
+              <a:t>a problem</a:t>
+            </a:r>
+            <a:r>
+              <a:rPr lang="en-US" dirty="0">
+                <a:latin typeface="Calibri" panose="020F0502020204030204" pitchFamily="34" charset="0"/>
+                <a:cs typeface="Calibri" panose="020F0502020204030204" pitchFamily="34" charset="0"/>
+              </a:rPr>
+              <a:t>?</a:t>
+            </a:r>
+          </a:p>
+        </p:txBody>
+      </p:sp>
+      <p:pic>
+        <p:nvPicPr>
+          <p:cNvPr id="6" name="Picture 5">
+            <a:extLst>
+              <a:ext uri="{FF2B5EF4-FFF2-40B4-BE49-F238E27FC236}">
+                <a16:creationId xmlns:a16="http://schemas.microsoft.com/office/drawing/2014/main" id="{6268FC52-8C78-A082-2743-112C0598C299}"/>
+              </a:ext>
+            </a:extLst>
+          </p:cNvPr>
+          <p:cNvPicPr>
+            <a:picLocks noChangeAspect="1"/>
+          </p:cNvPicPr>
+          <p:nvPr/>
+        </p:nvPicPr>
+        <p:blipFill>
+          <a:blip r:embed="rId2"/>
+          <a:stretch>
+            <a:fillRect/>
+          </a:stretch>
+        </p:blipFill>
+        <p:spPr>
+          <a:xfrm>
+            <a:off x="1748861" y="2139162"/>
+            <a:ext cx="5396293" cy="2884483"/>
+          </a:xfrm>
+          <a:prstGeom prst="rect">
+            <a:avLst/>
+          </a:prstGeom>
+        </p:spPr>
+      </p:pic>
+      <p:sp>
+        <p:nvSpPr>
+          <p:cNvPr id="7" name="TextBox 6">
+            <a:extLst>
+              <a:ext uri="{FF2B5EF4-FFF2-40B4-BE49-F238E27FC236}">
+                <a16:creationId xmlns:a16="http://schemas.microsoft.com/office/drawing/2014/main" id="{F7827610-E3E7-0F0A-5C49-BF962CC2739A}"/>
+              </a:ext>
+            </a:extLst>
+          </p:cNvPr>
+          <p:cNvSpPr txBox="1"/>
+          <p:nvPr/>
+        </p:nvSpPr>
+        <p:spPr>
+          <a:xfrm>
+            <a:off x="311699" y="723625"/>
+            <a:ext cx="8520599" cy="1323439"/>
+          </a:xfrm>
+          <a:prstGeom prst="rect">
+            <a:avLst/>
+          </a:prstGeom>
+          <a:noFill/>
+        </p:spPr>
+        <p:txBody>
+          <a:bodyPr wrap="square" rtlCol="0">
+            <a:spAutoFit/>
+          </a:bodyPr>
+          <a:lstStyle/>
+          <a:p>
+            <a:r>
+              <a:rPr lang="en-US" sz="1600" dirty="0">
+                <a:latin typeface="Calibri" panose="020F0502020204030204" pitchFamily="34" charset="0"/>
+                <a:cs typeface="Calibri" panose="020F0502020204030204" pitchFamily="34" charset="0"/>
+              </a:rPr>
+              <a:t>Changes in climate cause different types of weather and more frequent extreme weather patterns. Such changes involve rising in the number of hurricanes, prolonged droughts, and more severe flooding. </a:t>
+            </a:r>
+          </a:p>
+          <a:p>
+            <a:r>
+              <a:rPr lang="en-US" sz="1600" dirty="0">
+                <a:latin typeface="Calibri" panose="020F0502020204030204" pitchFamily="34" charset="0"/>
+                <a:cs typeface="Calibri" panose="020F0502020204030204" pitchFamily="34" charset="0"/>
+              </a:rPr>
+              <a:t>However, at the same time, one should take into account an association between increasing average temperatures around the world and rising numbers of witnessed natural disasters.</a:t>
+            </a:r>
+          </a:p>
+        </p:txBody>
+      </p:sp>
+    </p:spTree>
+    <p:extLst>
+      <p:ext uri="{BB962C8B-B14F-4D97-AF65-F5344CB8AC3E}">
+        <p14:creationId xmlns:p14="http://schemas.microsoft.com/office/powerpoint/2010/main" val="2999122261"/>
+      </p:ext>
+    </p:extLst>
+  </p:cSld>
+  <p:clrMapOvr>
+    <a:masterClrMapping/>
+  </p:clrMapOvr>
+</p:sld>
+</file>
+
+<file path=ppt/slides/slide5.xml><?xml version="1.0" encoding="utf-8"?>
+<p:sld xmlns:a="http://schemas.openxmlformats.org/drawingml/2006/main" xmlns:r="http://schemas.openxmlformats.org/officeDocument/2006/relationships" xmlns:p="http://schemas.openxmlformats.org/presentationml/2006/main">
+  <p:cSld>
+    <p:spTree>
+      <p:nvGrpSpPr>
+        <p:cNvPr id="1" name=""/>
+        <p:cNvGrpSpPr/>
+        <p:nvPr/>
+      </p:nvGrpSpPr>
+      <p:grpSpPr>
+        <a:xfrm>
+          <a:off x="0" y="0"/>
+          <a:ext cx="0" cy="0"/>
+          <a:chOff x="0" y="0"/>
+          <a:chExt cx="0" cy="0"/>
+        </a:xfrm>
+      </p:grpSpPr>
+      <p:sp>
+        <p:nvSpPr>
+          <p:cNvPr id="2" name="Title 1">
+            <a:extLst>
+              <a:ext uri="{FF2B5EF4-FFF2-40B4-BE49-F238E27FC236}">
+                <a16:creationId xmlns:a16="http://schemas.microsoft.com/office/drawing/2014/main" id="{A3DF84BE-98E2-982B-BAA9-02AD51B45272}"/>
+              </a:ext>
+            </a:extLst>
+          </p:cNvPr>
+          <p:cNvSpPr>
+            <a:spLocks noGrp="1"/>
+          </p:cNvSpPr>
+          <p:nvPr>
+            <p:ph type="title"/>
+          </p:nvPr>
+        </p:nvSpPr>
+        <p:spPr>
+          <a:xfrm>
+            <a:off x="576868" y="841800"/>
+            <a:ext cx="7700811" cy="841800"/>
+          </a:xfrm>
+        </p:spPr>
+        <p:txBody>
+          <a:bodyPr>
+            <a:normAutofit fontScale="90000"/>
+          </a:bodyPr>
+          <a:lstStyle/>
+          <a:p>
+            <a:pPr algn="l"/>
+            <a:r>
+              <a:rPr lang="en-US" sz="1600" dirty="0">
+                <a:solidFill>
+                  <a:schemeClr val="tx1"/>
+                </a:solidFill>
+                <a:latin typeface="Calibri" panose="020F0502020204030204" pitchFamily="34" charset="0"/>
+                <a:cs typeface="Calibri" panose="020F0502020204030204" pitchFamily="34" charset="0"/>
+              </a:rPr>
+              <a:t>The frequency of various types of disasters has increased for the last three decades, starting with year 1980. As the temperature keeps rising the amount of flooding, landslides, and even wildfire has increased significantly. Furthermore, there has been more extremes of wind, heat and drought than used to be in times past.</a:t>
+            </a:r>
+          </a:p>
+        </p:txBody>
+      </p:sp>
+      <p:sp>
+        <p:nvSpPr>
+          <p:cNvPr id="3" name="Title 1">
+            <a:extLst>
+              <a:ext uri="{FF2B5EF4-FFF2-40B4-BE49-F238E27FC236}">
+                <a16:creationId xmlns:a16="http://schemas.microsoft.com/office/drawing/2014/main" id="{00CF155C-47C5-C9EE-AFA4-A221A26BA7DB}"/>
+              </a:ext>
+            </a:extLst>
+          </p:cNvPr>
+          <p:cNvSpPr txBox="1">
+            <a:spLocks/>
+          </p:cNvSpPr>
+          <p:nvPr/>
+        </p:nvSpPr>
+        <p:spPr>
+          <a:xfrm>
+            <a:off x="311700" y="0"/>
+            <a:ext cx="8520600" cy="841800"/>
+          </a:xfrm>
+          <a:prstGeom prst="rect">
+            <a:avLst/>
+          </a:prstGeom>
+        </p:spPr>
+        <p:txBody>
+          <a:bodyPr spcFirstLastPara="1" vert="horz" wrap="square" lIns="91425" tIns="91425" rIns="91425" bIns="91425" rtlCol="0" anchor="ctr" anchorCtr="0">
+            <a:normAutofit/>
+          </a:bodyPr>
+          <a:lstStyle>
+            <a:lvl1pPr lvl="0" algn="ctr" defTabSz="685800" rtl="0" eaLnBrk="1" latinLnBrk="0" hangingPunct="1">
+              <a:lnSpc>
+                <a:spcPct val="90000"/>
+              </a:lnSpc>
+              <a:spcBef>
+                <a:spcPts val="0"/>
+              </a:spcBef>
+              <a:spcAft>
+                <a:spcPts val="0"/>
+              </a:spcAft>
+              <a:buSzPts val="3600"/>
+              <a:buNone/>
+              <a:defRPr sz="3600" b="0" i="0" kern="1200" cap="all">
+                <a:solidFill>
+                  <a:schemeClr val="tx1"/>
+                </a:solidFill>
+                <a:effectLst/>
+                <a:latin typeface="+mj-lt"/>
+                <a:ea typeface="+mj-ea"/>
+                <a:cs typeface="+mj-cs"/>
+              </a:defRPr>
+            </a:lvl1pPr>
+            <a:lvl2pPr lvl="1" algn="ctr">
+              <a:spcBef>
+                <a:spcPts val="0"/>
+              </a:spcBef>
+              <a:spcAft>
+                <a:spcPts val="0"/>
+              </a:spcAft>
+              <a:buSzPts val="3600"/>
+              <a:buNone/>
+              <a:defRPr sz="3600"/>
+            </a:lvl2pPr>
+            <a:lvl3pPr lvl="2" algn="ctr">
+              <a:spcBef>
+                <a:spcPts val="0"/>
+              </a:spcBef>
+              <a:spcAft>
+                <a:spcPts val="0"/>
+              </a:spcAft>
+              <a:buSzPts val="3600"/>
+              <a:buNone/>
+              <a:defRPr sz="3600"/>
+            </a:lvl3pPr>
+            <a:lvl4pPr lvl="3" algn="ctr">
+              <a:spcBef>
+                <a:spcPts val="0"/>
+              </a:spcBef>
+              <a:spcAft>
+                <a:spcPts val="0"/>
+              </a:spcAft>
+              <a:buSzPts val="3600"/>
+              <a:buNone/>
+              <a:defRPr sz="3600"/>
+            </a:lvl4pPr>
+            <a:lvl5pPr lvl="4" algn="ctr">
+              <a:spcBef>
+                <a:spcPts val="0"/>
+              </a:spcBef>
+              <a:spcAft>
+                <a:spcPts val="0"/>
+              </a:spcAft>
+              <a:buSzPts val="3600"/>
+              <a:buNone/>
+              <a:defRPr sz="3600"/>
+            </a:lvl5pPr>
+            <a:lvl6pPr lvl="5" algn="ctr">
+              <a:spcBef>
+                <a:spcPts val="0"/>
+              </a:spcBef>
+              <a:spcAft>
+                <a:spcPts val="0"/>
+              </a:spcAft>
+              <a:buSzPts val="3600"/>
+              <a:buNone/>
+              <a:defRPr sz="3600"/>
+            </a:lvl6pPr>
+            <a:lvl7pPr lvl="6" algn="ctr">
+              <a:spcBef>
+                <a:spcPts val="0"/>
+              </a:spcBef>
+              <a:spcAft>
+                <a:spcPts val="0"/>
+              </a:spcAft>
+              <a:buSzPts val="3600"/>
+              <a:buNone/>
+              <a:defRPr sz="3600"/>
+            </a:lvl7pPr>
+            <a:lvl8pPr lvl="7" algn="ctr">
+              <a:spcBef>
+                <a:spcPts val="0"/>
+              </a:spcBef>
+              <a:spcAft>
+                <a:spcPts val="0"/>
+              </a:spcAft>
+              <a:buSzPts val="3600"/>
+              <a:buNone/>
+              <a:defRPr sz="3600"/>
+            </a:lvl8pPr>
+            <a:lvl9pPr lvl="8" algn="ctr">
+              <a:spcBef>
+                <a:spcPts val="0"/>
+              </a:spcBef>
+              <a:spcAft>
+                <a:spcPts val="0"/>
+              </a:spcAft>
+              <a:buSzPts val="3600"/>
+              <a:buNone/>
+              <a:defRPr sz="3600"/>
+            </a:lvl9pPr>
+          </a:lstStyle>
+          <a:p>
+            <a:r>
+              <a:rPr lang="en-US" dirty="0">
+                <a:latin typeface="Calibri" panose="020F0502020204030204" pitchFamily="34" charset="0"/>
+                <a:cs typeface="Calibri" panose="020F0502020204030204" pitchFamily="34" charset="0"/>
+              </a:rPr>
+              <a:t>Why is It </a:t>
+            </a:r>
+            <a:r>
+              <a:rPr lang="en-US" b="1" dirty="0">
+                <a:latin typeface="Calibri" panose="020F0502020204030204" pitchFamily="34" charset="0"/>
+                <a:cs typeface="Calibri" panose="020F0502020204030204" pitchFamily="34" charset="0"/>
+              </a:rPr>
+              <a:t>a problem</a:t>
+            </a:r>
+            <a:r>
+              <a:rPr lang="en-US" dirty="0">
+                <a:latin typeface="Calibri" panose="020F0502020204030204" pitchFamily="34" charset="0"/>
+                <a:cs typeface="Calibri" panose="020F0502020204030204" pitchFamily="34" charset="0"/>
+              </a:rPr>
+              <a:t>?</a:t>
+            </a:r>
+          </a:p>
+        </p:txBody>
+      </p:sp>
+      <p:pic>
+        <p:nvPicPr>
+          <p:cNvPr id="6" name="Picture 5">
+            <a:extLst>
+              <a:ext uri="{FF2B5EF4-FFF2-40B4-BE49-F238E27FC236}">
+                <a16:creationId xmlns:a16="http://schemas.microsoft.com/office/drawing/2014/main" id="{90373E37-7FFA-05B9-CF0F-A41A6C51B3BC}"/>
+              </a:ext>
+            </a:extLst>
+          </p:cNvPr>
+          <p:cNvPicPr>
+            <a:picLocks noChangeAspect="1"/>
+          </p:cNvPicPr>
+          <p:nvPr/>
+        </p:nvPicPr>
+        <p:blipFill>
+          <a:blip r:embed="rId2"/>
+          <a:stretch>
+            <a:fillRect/>
+          </a:stretch>
+        </p:blipFill>
+        <p:spPr>
+          <a:xfrm>
+            <a:off x="1425790" y="1683600"/>
+            <a:ext cx="6292420" cy="3248395"/>
+          </a:xfrm>
+          <a:prstGeom prst="rect">
+            <a:avLst/>
+          </a:prstGeom>
+        </p:spPr>
+      </p:pic>
+    </p:spTree>
+    <p:extLst>
+      <p:ext uri="{BB962C8B-B14F-4D97-AF65-F5344CB8AC3E}">
+        <p14:creationId xmlns:p14="http://schemas.microsoft.com/office/powerpoint/2010/main" val="1792892047"/>
+      </p:ext>
+    </p:extLst>
+  </p:cSld>
+  <p:clrMapOvr>
+    <a:masterClrMapping/>
+  </p:clrMapOvr>
+</p:sld>
+</file>
+
+<file path=ppt/slides/slide6.xml><?xml version="1.0" encoding="utf-8"?>
+<p:sld xmlns:a="http://schemas.openxmlformats.org/drawingml/2006/main" xmlns:r="http://schemas.openxmlformats.org/officeDocument/2006/relationships" xmlns:p="http://schemas.openxmlformats.org/presentationml/2006/main">
+  <p:cSld>
+    <p:spTree>
+      <p:nvGrpSpPr>
+        <p:cNvPr id="1" name=""/>
+        <p:cNvGrpSpPr/>
+        <p:nvPr/>
+      </p:nvGrpSpPr>
+      <p:grpSpPr>
+        <a:xfrm>
+          <a:off x="0" y="0"/>
+          <a:ext cx="0" cy="0"/>
+          <a:chOff x="0" y="0"/>
+          <a:chExt cx="0" cy="0"/>
+        </a:xfrm>
+      </p:grpSpPr>
+      <p:sp>
+        <p:nvSpPr>
+          <p:cNvPr id="2" name="Title 1">
+            <a:extLst>
+              <a:ext uri="{FF2B5EF4-FFF2-40B4-BE49-F238E27FC236}">
+                <a16:creationId xmlns:a16="http://schemas.microsoft.com/office/drawing/2014/main" id="{A3B58016-4C52-D983-FF1B-CC9D9066CD9B}"/>
+              </a:ext>
+            </a:extLst>
+          </p:cNvPr>
+          <p:cNvSpPr>
+            <a:spLocks noGrp="1"/>
+          </p:cNvSpPr>
+          <p:nvPr>
+            <p:ph type="title"/>
+          </p:nvPr>
+        </p:nvSpPr>
+        <p:spPr>
+          <a:xfrm>
+            <a:off x="311700" y="0"/>
+            <a:ext cx="8520600" cy="841800"/>
+          </a:xfrm>
+        </p:spPr>
+        <p:txBody>
+          <a:bodyPr/>
+          <a:lstStyle/>
+          <a:p>
+            <a:r>
+              <a:rPr lang="en-US" dirty="0">
+                <a:solidFill>
+                  <a:schemeClr val="tx1"/>
+                </a:solidFill>
+                <a:latin typeface="Calibri" panose="020F0502020204030204" pitchFamily="34" charset="0"/>
+                <a:cs typeface="Calibri" panose="020F0502020204030204" pitchFamily="34" charset="0"/>
+              </a:rPr>
+              <a:t>WHY IS IT </a:t>
+            </a:r>
+            <a:r>
+              <a:rPr lang="en-US" b="1" dirty="0">
+                <a:solidFill>
+                  <a:schemeClr val="tx1"/>
+                </a:solidFill>
+                <a:latin typeface="Calibri" panose="020F0502020204030204" pitchFamily="34" charset="0"/>
+                <a:cs typeface="Calibri" panose="020F0502020204030204" pitchFamily="34" charset="0"/>
+              </a:rPr>
+              <a:t>A PROBLEM</a:t>
+            </a:r>
+            <a:r>
+              <a:rPr lang="en-US" dirty="0">
+                <a:solidFill>
+                  <a:schemeClr val="tx1"/>
+                </a:solidFill>
+                <a:latin typeface="Calibri" panose="020F0502020204030204" pitchFamily="34" charset="0"/>
+                <a:cs typeface="Calibri" panose="020F0502020204030204" pitchFamily="34" charset="0"/>
+              </a:rPr>
+              <a:t>?</a:t>
+            </a:r>
+          </a:p>
+        </p:txBody>
+      </p:sp>
+      <p:sp>
+        <p:nvSpPr>
+          <p:cNvPr id="3" name="TextBox 2">
+            <a:extLst>
+              <a:ext uri="{FF2B5EF4-FFF2-40B4-BE49-F238E27FC236}">
+                <a16:creationId xmlns:a16="http://schemas.microsoft.com/office/drawing/2014/main" id="{2D0263E7-5935-7F4C-0895-873EB67EB98E}"/>
+              </a:ext>
+            </a:extLst>
+          </p:cNvPr>
+          <p:cNvSpPr txBox="1"/>
+          <p:nvPr/>
+        </p:nvSpPr>
+        <p:spPr>
+          <a:xfrm>
+            <a:off x="513115" y="717084"/>
+            <a:ext cx="8117767" cy="954107"/>
+          </a:xfrm>
+          <a:prstGeom prst="rect">
+            <a:avLst/>
+          </a:prstGeom>
+          <a:noFill/>
+        </p:spPr>
+        <p:txBody>
+          <a:bodyPr wrap="square" rtlCol="0">
+            <a:spAutoFit/>
+          </a:bodyPr>
+          <a:lstStyle/>
+          <a:p>
+            <a:r>
+              <a:rPr lang="en-US" sz="1400" dirty="0">
+                <a:latin typeface="Calibri" panose="020F0502020204030204" pitchFamily="34" charset="0"/>
+                <a:cs typeface="Calibri" panose="020F0502020204030204" pitchFamily="34" charset="0"/>
+              </a:rPr>
+              <a:t>The retreat of sea ice caused by increasing global temperatures has reduced the area of ice where many polar mammals engage in vital pursuits such as feeding, mating, and resting. This change poses a lot of problems to creatures like polar bears and seals by messing up with their feeding grounds as well as the breeding zones. The declining of ice makes it difficult the animals to find food and place of breeding as a well the rest.</a:t>
             </a:r>
           </a:p>
         </p:txBody>
@@ -7280,774 +8370,6 @@
 </p:sld>
 </file>
 
-<file path=ppt/slides/slide4.xml><?xml version="1.0" encoding="utf-8"?>
-<p:sld xmlns:a="http://schemas.openxmlformats.org/drawingml/2006/main" xmlns:r="http://schemas.openxmlformats.org/officeDocument/2006/relationships" xmlns:p="http://schemas.openxmlformats.org/presentationml/2006/main">
-  <p:cSld>
-    <p:spTree>
-      <p:nvGrpSpPr>
-        <p:cNvPr id="1" name=""/>
-        <p:cNvGrpSpPr/>
-        <p:nvPr/>
-      </p:nvGrpSpPr>
-      <p:grpSpPr>
-        <a:xfrm>
-          <a:off x="0" y="0"/>
-          <a:ext cx="0" cy="0"/>
-          <a:chOff x="0" y="0"/>
-          <a:chExt cx="0" cy="0"/>
-        </a:xfrm>
-      </p:grpSpPr>
-      <p:sp>
-        <p:nvSpPr>
-          <p:cNvPr id="3" name="Title 1">
-            <a:extLst>
-              <a:ext uri="{FF2B5EF4-FFF2-40B4-BE49-F238E27FC236}">
-                <a16:creationId xmlns:a16="http://schemas.microsoft.com/office/drawing/2014/main" id="{5645BF0C-628B-3C34-93B2-1752868A6DE2}"/>
-              </a:ext>
-            </a:extLst>
-          </p:cNvPr>
-          <p:cNvSpPr txBox="1">
-            <a:spLocks/>
-          </p:cNvSpPr>
-          <p:nvPr/>
-        </p:nvSpPr>
-        <p:spPr>
-          <a:xfrm>
-            <a:off x="311700" y="0"/>
-            <a:ext cx="8520600" cy="841800"/>
-          </a:xfrm>
-          <a:prstGeom prst="rect">
-            <a:avLst/>
-          </a:prstGeom>
-        </p:spPr>
-        <p:txBody>
-          <a:bodyPr spcFirstLastPara="1" vert="horz" wrap="square" lIns="91425" tIns="91425" rIns="91425" bIns="91425" rtlCol="0" anchor="ctr" anchorCtr="0">
-            <a:normAutofit/>
-          </a:bodyPr>
-          <a:lstStyle>
-            <a:lvl1pPr lvl="0" algn="ctr" defTabSz="685800" rtl="0" eaLnBrk="1" latinLnBrk="0" hangingPunct="1">
-              <a:lnSpc>
-                <a:spcPct val="90000"/>
-              </a:lnSpc>
-              <a:spcBef>
-                <a:spcPts val="0"/>
-              </a:spcBef>
-              <a:spcAft>
-                <a:spcPts val="0"/>
-              </a:spcAft>
-              <a:buSzPts val="3600"/>
-              <a:buNone/>
-              <a:defRPr sz="3600" b="0" i="0" kern="1200" cap="all">
-                <a:solidFill>
-                  <a:schemeClr val="tx1"/>
-                </a:solidFill>
-                <a:effectLst/>
-                <a:latin typeface="+mj-lt"/>
-                <a:ea typeface="+mj-ea"/>
-                <a:cs typeface="+mj-cs"/>
-              </a:defRPr>
-            </a:lvl1pPr>
-            <a:lvl2pPr lvl="1" algn="ctr">
-              <a:spcBef>
-                <a:spcPts val="0"/>
-              </a:spcBef>
-              <a:spcAft>
-                <a:spcPts val="0"/>
-              </a:spcAft>
-              <a:buSzPts val="3600"/>
-              <a:buNone/>
-              <a:defRPr sz="3600"/>
-            </a:lvl2pPr>
-            <a:lvl3pPr lvl="2" algn="ctr">
-              <a:spcBef>
-                <a:spcPts val="0"/>
-              </a:spcBef>
-              <a:spcAft>
-                <a:spcPts val="0"/>
-              </a:spcAft>
-              <a:buSzPts val="3600"/>
-              <a:buNone/>
-              <a:defRPr sz="3600"/>
-            </a:lvl3pPr>
-            <a:lvl4pPr lvl="3" algn="ctr">
-              <a:spcBef>
-                <a:spcPts val="0"/>
-              </a:spcBef>
-              <a:spcAft>
-                <a:spcPts val="0"/>
-              </a:spcAft>
-              <a:buSzPts val="3600"/>
-              <a:buNone/>
-              <a:defRPr sz="3600"/>
-            </a:lvl4pPr>
-            <a:lvl5pPr lvl="4" algn="ctr">
-              <a:spcBef>
-                <a:spcPts val="0"/>
-              </a:spcBef>
-              <a:spcAft>
-                <a:spcPts val="0"/>
-              </a:spcAft>
-              <a:buSzPts val="3600"/>
-              <a:buNone/>
-              <a:defRPr sz="3600"/>
-            </a:lvl5pPr>
-            <a:lvl6pPr lvl="5" algn="ctr">
-              <a:spcBef>
-                <a:spcPts val="0"/>
-              </a:spcBef>
-              <a:spcAft>
-                <a:spcPts val="0"/>
-              </a:spcAft>
-              <a:buSzPts val="3600"/>
-              <a:buNone/>
-              <a:defRPr sz="3600"/>
-            </a:lvl6pPr>
-            <a:lvl7pPr lvl="6" algn="ctr">
-              <a:spcBef>
-                <a:spcPts val="0"/>
-              </a:spcBef>
-              <a:spcAft>
-                <a:spcPts val="0"/>
-              </a:spcAft>
-              <a:buSzPts val="3600"/>
-              <a:buNone/>
-              <a:defRPr sz="3600"/>
-            </a:lvl7pPr>
-            <a:lvl8pPr lvl="7" algn="ctr">
-              <a:spcBef>
-                <a:spcPts val="0"/>
-              </a:spcBef>
-              <a:spcAft>
-                <a:spcPts val="0"/>
-              </a:spcAft>
-              <a:buSzPts val="3600"/>
-              <a:buNone/>
-              <a:defRPr sz="3600"/>
-            </a:lvl8pPr>
-            <a:lvl9pPr lvl="8" algn="ctr">
-              <a:spcBef>
-                <a:spcPts val="0"/>
-              </a:spcBef>
-              <a:spcAft>
-                <a:spcPts val="0"/>
-              </a:spcAft>
-              <a:buSzPts val="3600"/>
-              <a:buNone/>
-              <a:defRPr sz="3600"/>
-            </a:lvl9pPr>
-          </a:lstStyle>
-          <a:p>
-            <a:r>
-              <a:rPr lang="en-US" dirty="0">
-                <a:latin typeface="Calibri" panose="020F0502020204030204" pitchFamily="34" charset="0"/>
-                <a:cs typeface="Calibri" panose="020F0502020204030204" pitchFamily="34" charset="0"/>
-              </a:rPr>
-              <a:t>Why is It </a:t>
-            </a:r>
-            <a:r>
-              <a:rPr lang="en-US" b="1" dirty="0">
-                <a:latin typeface="Calibri" panose="020F0502020204030204" pitchFamily="34" charset="0"/>
-                <a:cs typeface="Calibri" panose="020F0502020204030204" pitchFamily="34" charset="0"/>
-              </a:rPr>
-              <a:t>a problem</a:t>
-            </a:r>
-            <a:r>
-              <a:rPr lang="en-US" dirty="0">
-                <a:latin typeface="Calibri" panose="020F0502020204030204" pitchFamily="34" charset="0"/>
-                <a:cs typeface="Calibri" panose="020F0502020204030204" pitchFamily="34" charset="0"/>
-              </a:rPr>
-              <a:t>?</a:t>
-            </a:r>
-          </a:p>
-        </p:txBody>
-      </p:sp>
-      <p:pic>
-        <p:nvPicPr>
-          <p:cNvPr id="6" name="Picture 5">
-            <a:extLst>
-              <a:ext uri="{FF2B5EF4-FFF2-40B4-BE49-F238E27FC236}">
-                <a16:creationId xmlns:a16="http://schemas.microsoft.com/office/drawing/2014/main" id="{6268FC52-8C78-A082-2743-112C0598C299}"/>
-              </a:ext>
-            </a:extLst>
-          </p:cNvPr>
-          <p:cNvPicPr>
-            <a:picLocks noChangeAspect="1"/>
-          </p:cNvPicPr>
-          <p:nvPr/>
-        </p:nvPicPr>
-        <p:blipFill>
-          <a:blip r:embed="rId2"/>
-          <a:stretch>
-            <a:fillRect/>
-          </a:stretch>
-        </p:blipFill>
-        <p:spPr>
-          <a:xfrm>
-            <a:off x="1873851" y="1800843"/>
-            <a:ext cx="5396293" cy="2884483"/>
-          </a:xfrm>
-          <a:prstGeom prst="rect">
-            <a:avLst/>
-          </a:prstGeom>
-        </p:spPr>
-      </p:pic>
-      <p:sp>
-        <p:nvSpPr>
-          <p:cNvPr id="7" name="TextBox 6">
-            <a:extLst>
-              <a:ext uri="{FF2B5EF4-FFF2-40B4-BE49-F238E27FC236}">
-                <a16:creationId xmlns:a16="http://schemas.microsoft.com/office/drawing/2014/main" id="{F7827610-E3E7-0F0A-5C49-BF962CC2739A}"/>
-              </a:ext>
-            </a:extLst>
-          </p:cNvPr>
-          <p:cNvSpPr txBox="1"/>
-          <p:nvPr/>
-        </p:nvSpPr>
-        <p:spPr>
-          <a:xfrm>
-            <a:off x="311699" y="723625"/>
-            <a:ext cx="8520599" cy="1077218"/>
-          </a:xfrm>
-          <a:prstGeom prst="rect">
-            <a:avLst/>
-          </a:prstGeom>
-          <a:noFill/>
-        </p:spPr>
-        <p:txBody>
-          <a:bodyPr wrap="square" rtlCol="0">
-            <a:spAutoFit/>
-          </a:bodyPr>
-          <a:lstStyle/>
-          <a:p>
-            <a:r>
-              <a:rPr lang="en-US" sz="1600" dirty="0">
-                <a:latin typeface="Calibri" panose="020F0502020204030204" pitchFamily="34" charset="0"/>
-                <a:cs typeface="Calibri" panose="020F0502020204030204" pitchFamily="34" charset="0"/>
-              </a:rPr>
-              <a:t>Changes in the climate lead to disturbances in weather patterns, amplifying the frequency of extreme weather events. These encompass heightened hurricane activity, prolonged droughts, and escalated occurrences of floods. Concurrently, the surge in global temperatures parallels a noticeable uptick in documented natural disasters.</a:t>
-            </a:r>
-          </a:p>
-        </p:txBody>
-      </p:sp>
-    </p:spTree>
-    <p:extLst>
-      <p:ext uri="{BB962C8B-B14F-4D97-AF65-F5344CB8AC3E}">
-        <p14:creationId xmlns:p14="http://schemas.microsoft.com/office/powerpoint/2010/main" val="2999122261"/>
-      </p:ext>
-    </p:extLst>
-  </p:cSld>
-  <p:clrMapOvr>
-    <a:masterClrMapping/>
-  </p:clrMapOvr>
-</p:sld>
-</file>
-
-<file path=ppt/slides/slide5.xml><?xml version="1.0" encoding="utf-8"?>
-<p:sld xmlns:a="http://schemas.openxmlformats.org/drawingml/2006/main" xmlns:r="http://schemas.openxmlformats.org/officeDocument/2006/relationships" xmlns:p="http://schemas.openxmlformats.org/presentationml/2006/main">
-  <p:cSld>
-    <p:spTree>
-      <p:nvGrpSpPr>
-        <p:cNvPr id="1" name=""/>
-        <p:cNvGrpSpPr/>
-        <p:nvPr/>
-      </p:nvGrpSpPr>
-      <p:grpSpPr>
-        <a:xfrm>
-          <a:off x="0" y="0"/>
-          <a:ext cx="0" cy="0"/>
-          <a:chOff x="0" y="0"/>
-          <a:chExt cx="0" cy="0"/>
-        </a:xfrm>
-      </p:grpSpPr>
-      <p:sp>
-        <p:nvSpPr>
-          <p:cNvPr id="2" name="Title 1">
-            <a:extLst>
-              <a:ext uri="{FF2B5EF4-FFF2-40B4-BE49-F238E27FC236}">
-                <a16:creationId xmlns:a16="http://schemas.microsoft.com/office/drawing/2014/main" id="{A3DF84BE-98E2-982B-BAA9-02AD51B45272}"/>
-              </a:ext>
-            </a:extLst>
-          </p:cNvPr>
-          <p:cNvSpPr>
-            <a:spLocks noGrp="1"/>
-          </p:cNvSpPr>
-          <p:nvPr>
-            <p:ph type="title"/>
-          </p:nvPr>
-        </p:nvSpPr>
-        <p:spPr>
-          <a:xfrm>
-            <a:off x="166975" y="841800"/>
-            <a:ext cx="8520600" cy="841800"/>
-          </a:xfrm>
-        </p:spPr>
-        <p:txBody>
-          <a:bodyPr>
-            <a:normAutofit/>
-          </a:bodyPr>
-          <a:lstStyle/>
-          <a:p>
-            <a:r>
-              <a:rPr lang="en-US" sz="1600" dirty="0">
-                <a:solidFill>
-                  <a:schemeClr val="tx1"/>
-                </a:solidFill>
-                <a:latin typeface="Calibri" panose="020F0502020204030204" pitchFamily="34" charset="0"/>
-                <a:cs typeface="Calibri" panose="020F0502020204030204" pitchFamily="34" charset="0"/>
-              </a:rPr>
-              <a:t>There has been a lot of flooding and landslide increasing with </a:t>
-            </a:r>
-            <a:r>
-              <a:rPr lang="en-US" sz="1600">
-                <a:solidFill>
-                  <a:schemeClr val="tx1"/>
-                </a:solidFill>
-                <a:latin typeface="Calibri" panose="020F0502020204030204" pitchFamily="34" charset="0"/>
-                <a:cs typeface="Calibri" panose="020F0502020204030204" pitchFamily="34" charset="0"/>
-              </a:rPr>
-              <a:t>temperature rise</a:t>
-            </a:r>
-            <a:endParaRPr lang="en-US" sz="1600" dirty="0">
-              <a:solidFill>
-                <a:schemeClr val="tx1"/>
-              </a:solidFill>
-              <a:latin typeface="Calibri" panose="020F0502020204030204" pitchFamily="34" charset="0"/>
-              <a:cs typeface="Calibri" panose="020F0502020204030204" pitchFamily="34" charset="0"/>
-            </a:endParaRPr>
-          </a:p>
-        </p:txBody>
-      </p:sp>
-      <p:sp>
-        <p:nvSpPr>
-          <p:cNvPr id="3" name="Title 1">
-            <a:extLst>
-              <a:ext uri="{FF2B5EF4-FFF2-40B4-BE49-F238E27FC236}">
-                <a16:creationId xmlns:a16="http://schemas.microsoft.com/office/drawing/2014/main" id="{00CF155C-47C5-C9EE-AFA4-A221A26BA7DB}"/>
-              </a:ext>
-            </a:extLst>
-          </p:cNvPr>
-          <p:cNvSpPr txBox="1">
-            <a:spLocks/>
-          </p:cNvSpPr>
-          <p:nvPr/>
-        </p:nvSpPr>
-        <p:spPr>
-          <a:xfrm>
-            <a:off x="311700" y="0"/>
-            <a:ext cx="8520600" cy="841800"/>
-          </a:xfrm>
-          <a:prstGeom prst="rect">
-            <a:avLst/>
-          </a:prstGeom>
-        </p:spPr>
-        <p:txBody>
-          <a:bodyPr spcFirstLastPara="1" vert="horz" wrap="square" lIns="91425" tIns="91425" rIns="91425" bIns="91425" rtlCol="0" anchor="ctr" anchorCtr="0">
-            <a:normAutofit/>
-          </a:bodyPr>
-          <a:lstStyle>
-            <a:lvl1pPr lvl="0" algn="ctr" defTabSz="685800" rtl="0" eaLnBrk="1" latinLnBrk="0" hangingPunct="1">
-              <a:lnSpc>
-                <a:spcPct val="90000"/>
-              </a:lnSpc>
-              <a:spcBef>
-                <a:spcPts val="0"/>
-              </a:spcBef>
-              <a:spcAft>
-                <a:spcPts val="0"/>
-              </a:spcAft>
-              <a:buSzPts val="3600"/>
-              <a:buNone/>
-              <a:defRPr sz="3600" b="0" i="0" kern="1200" cap="all">
-                <a:solidFill>
-                  <a:schemeClr val="tx1"/>
-                </a:solidFill>
-                <a:effectLst/>
-                <a:latin typeface="+mj-lt"/>
-                <a:ea typeface="+mj-ea"/>
-                <a:cs typeface="+mj-cs"/>
-              </a:defRPr>
-            </a:lvl1pPr>
-            <a:lvl2pPr lvl="1" algn="ctr">
-              <a:spcBef>
-                <a:spcPts val="0"/>
-              </a:spcBef>
-              <a:spcAft>
-                <a:spcPts val="0"/>
-              </a:spcAft>
-              <a:buSzPts val="3600"/>
-              <a:buNone/>
-              <a:defRPr sz="3600"/>
-            </a:lvl2pPr>
-            <a:lvl3pPr lvl="2" algn="ctr">
-              <a:spcBef>
-                <a:spcPts val="0"/>
-              </a:spcBef>
-              <a:spcAft>
-                <a:spcPts val="0"/>
-              </a:spcAft>
-              <a:buSzPts val="3600"/>
-              <a:buNone/>
-              <a:defRPr sz="3600"/>
-            </a:lvl3pPr>
-            <a:lvl4pPr lvl="3" algn="ctr">
-              <a:spcBef>
-                <a:spcPts val="0"/>
-              </a:spcBef>
-              <a:spcAft>
-                <a:spcPts val="0"/>
-              </a:spcAft>
-              <a:buSzPts val="3600"/>
-              <a:buNone/>
-              <a:defRPr sz="3600"/>
-            </a:lvl4pPr>
-            <a:lvl5pPr lvl="4" algn="ctr">
-              <a:spcBef>
-                <a:spcPts val="0"/>
-              </a:spcBef>
-              <a:spcAft>
-                <a:spcPts val="0"/>
-              </a:spcAft>
-              <a:buSzPts val="3600"/>
-              <a:buNone/>
-              <a:defRPr sz="3600"/>
-            </a:lvl5pPr>
-            <a:lvl6pPr lvl="5" algn="ctr">
-              <a:spcBef>
-                <a:spcPts val="0"/>
-              </a:spcBef>
-              <a:spcAft>
-                <a:spcPts val="0"/>
-              </a:spcAft>
-              <a:buSzPts val="3600"/>
-              <a:buNone/>
-              <a:defRPr sz="3600"/>
-            </a:lvl6pPr>
-            <a:lvl7pPr lvl="6" algn="ctr">
-              <a:spcBef>
-                <a:spcPts val="0"/>
-              </a:spcBef>
-              <a:spcAft>
-                <a:spcPts val="0"/>
-              </a:spcAft>
-              <a:buSzPts val="3600"/>
-              <a:buNone/>
-              <a:defRPr sz="3600"/>
-            </a:lvl7pPr>
-            <a:lvl8pPr lvl="7" algn="ctr">
-              <a:spcBef>
-                <a:spcPts val="0"/>
-              </a:spcBef>
-              <a:spcAft>
-                <a:spcPts val="0"/>
-              </a:spcAft>
-              <a:buSzPts val="3600"/>
-              <a:buNone/>
-              <a:defRPr sz="3600"/>
-            </a:lvl8pPr>
-            <a:lvl9pPr lvl="8" algn="ctr">
-              <a:spcBef>
-                <a:spcPts val="0"/>
-              </a:spcBef>
-              <a:spcAft>
-                <a:spcPts val="0"/>
-              </a:spcAft>
-              <a:buSzPts val="3600"/>
-              <a:buNone/>
-              <a:defRPr sz="3600"/>
-            </a:lvl9pPr>
-          </a:lstStyle>
-          <a:p>
-            <a:r>
-              <a:rPr lang="en-US" dirty="0">
-                <a:latin typeface="Calibri" panose="020F0502020204030204" pitchFamily="34" charset="0"/>
-                <a:cs typeface="Calibri" panose="020F0502020204030204" pitchFamily="34" charset="0"/>
-              </a:rPr>
-              <a:t>Why is It </a:t>
-            </a:r>
-            <a:r>
-              <a:rPr lang="en-US" b="1" dirty="0">
-                <a:latin typeface="Calibri" panose="020F0502020204030204" pitchFamily="34" charset="0"/>
-                <a:cs typeface="Calibri" panose="020F0502020204030204" pitchFamily="34" charset="0"/>
-              </a:rPr>
-              <a:t>a problem</a:t>
-            </a:r>
-            <a:r>
-              <a:rPr lang="en-US" dirty="0">
-                <a:latin typeface="Calibri" panose="020F0502020204030204" pitchFamily="34" charset="0"/>
-                <a:cs typeface="Calibri" panose="020F0502020204030204" pitchFamily="34" charset="0"/>
-              </a:rPr>
-              <a:t>?</a:t>
-            </a:r>
-          </a:p>
-        </p:txBody>
-      </p:sp>
-      <p:pic>
-        <p:nvPicPr>
-          <p:cNvPr id="5" name="Picture 4">
-            <a:extLst>
-              <a:ext uri="{FF2B5EF4-FFF2-40B4-BE49-F238E27FC236}">
-                <a16:creationId xmlns:a16="http://schemas.microsoft.com/office/drawing/2014/main" id="{358899DD-C480-D846-D1D2-F743E47A8A9C}"/>
-              </a:ext>
-            </a:extLst>
-          </p:cNvPr>
-          <p:cNvPicPr>
-            <a:picLocks noChangeAspect="1"/>
-          </p:cNvPicPr>
-          <p:nvPr/>
-        </p:nvPicPr>
-        <p:blipFill>
-          <a:blip r:embed="rId2"/>
-          <a:stretch>
-            <a:fillRect/>
-          </a:stretch>
-        </p:blipFill>
-        <p:spPr>
-          <a:xfrm>
-            <a:off x="1855114" y="2085002"/>
-            <a:ext cx="5144322" cy="2749797"/>
-          </a:xfrm>
-          <a:prstGeom prst="rect">
-            <a:avLst/>
-          </a:prstGeom>
-        </p:spPr>
-      </p:pic>
-    </p:spTree>
-    <p:extLst>
-      <p:ext uri="{BB962C8B-B14F-4D97-AF65-F5344CB8AC3E}">
-        <p14:creationId xmlns:p14="http://schemas.microsoft.com/office/powerpoint/2010/main" val="1792892047"/>
-      </p:ext>
-    </p:extLst>
-  </p:cSld>
-  <p:clrMapOvr>
-    <a:masterClrMapping/>
-  </p:clrMapOvr>
-</p:sld>
-</file>
-
-<file path=ppt/slides/slide6.xml><?xml version="1.0" encoding="utf-8"?>
-<p:sld xmlns:a="http://schemas.openxmlformats.org/drawingml/2006/main" xmlns:r="http://schemas.openxmlformats.org/officeDocument/2006/relationships" xmlns:p="http://schemas.openxmlformats.org/presentationml/2006/main">
-  <p:cSld>
-    <p:spTree>
-      <p:nvGrpSpPr>
-        <p:cNvPr id="1" name=""/>
-        <p:cNvGrpSpPr/>
-        <p:nvPr/>
-      </p:nvGrpSpPr>
-      <p:grpSpPr>
-        <a:xfrm>
-          <a:off x="0" y="0"/>
-          <a:ext cx="0" cy="0"/>
-          <a:chOff x="0" y="0"/>
-          <a:chExt cx="0" cy="0"/>
-        </a:xfrm>
-      </p:grpSpPr>
-      <p:sp>
-        <p:nvSpPr>
-          <p:cNvPr id="3" name="Title 1">
-            <a:extLst>
-              <a:ext uri="{FF2B5EF4-FFF2-40B4-BE49-F238E27FC236}">
-                <a16:creationId xmlns:a16="http://schemas.microsoft.com/office/drawing/2014/main" id="{00CF155C-47C5-C9EE-AFA4-A221A26BA7DB}"/>
-              </a:ext>
-            </a:extLst>
-          </p:cNvPr>
-          <p:cNvSpPr txBox="1">
-            <a:spLocks/>
-          </p:cNvSpPr>
-          <p:nvPr/>
-        </p:nvSpPr>
-        <p:spPr>
-          <a:xfrm>
-            <a:off x="311700" y="0"/>
-            <a:ext cx="8520600" cy="841800"/>
-          </a:xfrm>
-          <a:prstGeom prst="rect">
-            <a:avLst/>
-          </a:prstGeom>
-        </p:spPr>
-        <p:txBody>
-          <a:bodyPr spcFirstLastPara="1" vert="horz" wrap="square" lIns="91425" tIns="91425" rIns="91425" bIns="91425" rtlCol="0" anchor="ctr" anchorCtr="0">
-            <a:normAutofit/>
-          </a:bodyPr>
-          <a:lstStyle>
-            <a:lvl1pPr lvl="0" algn="ctr" defTabSz="685800" rtl="0" eaLnBrk="1" latinLnBrk="0" hangingPunct="1">
-              <a:lnSpc>
-                <a:spcPct val="90000"/>
-              </a:lnSpc>
-              <a:spcBef>
-                <a:spcPts val="0"/>
-              </a:spcBef>
-              <a:spcAft>
-                <a:spcPts val="0"/>
-              </a:spcAft>
-              <a:buSzPts val="3600"/>
-              <a:buNone/>
-              <a:defRPr sz="3600" b="0" i="0" kern="1200" cap="all">
-                <a:solidFill>
-                  <a:schemeClr val="tx1"/>
-                </a:solidFill>
-                <a:effectLst/>
-                <a:latin typeface="+mj-lt"/>
-                <a:ea typeface="+mj-ea"/>
-                <a:cs typeface="+mj-cs"/>
-              </a:defRPr>
-            </a:lvl1pPr>
-            <a:lvl2pPr lvl="1" algn="ctr">
-              <a:spcBef>
-                <a:spcPts val="0"/>
-              </a:spcBef>
-              <a:spcAft>
-                <a:spcPts val="0"/>
-              </a:spcAft>
-              <a:buSzPts val="3600"/>
-              <a:buNone/>
-              <a:defRPr sz="3600"/>
-            </a:lvl2pPr>
-            <a:lvl3pPr lvl="2" algn="ctr">
-              <a:spcBef>
-                <a:spcPts val="0"/>
-              </a:spcBef>
-              <a:spcAft>
-                <a:spcPts val="0"/>
-              </a:spcAft>
-              <a:buSzPts val="3600"/>
-              <a:buNone/>
-              <a:defRPr sz="3600"/>
-            </a:lvl3pPr>
-            <a:lvl4pPr lvl="3" algn="ctr">
-              <a:spcBef>
-                <a:spcPts val="0"/>
-              </a:spcBef>
-              <a:spcAft>
-                <a:spcPts val="0"/>
-              </a:spcAft>
-              <a:buSzPts val="3600"/>
-              <a:buNone/>
-              <a:defRPr sz="3600"/>
-            </a:lvl4pPr>
-            <a:lvl5pPr lvl="4" algn="ctr">
-              <a:spcBef>
-                <a:spcPts val="0"/>
-              </a:spcBef>
-              <a:spcAft>
-                <a:spcPts val="0"/>
-              </a:spcAft>
-              <a:buSzPts val="3600"/>
-              <a:buNone/>
-              <a:defRPr sz="3600"/>
-            </a:lvl5pPr>
-            <a:lvl6pPr lvl="5" algn="ctr">
-              <a:spcBef>
-                <a:spcPts val="0"/>
-              </a:spcBef>
-              <a:spcAft>
-                <a:spcPts val="0"/>
-              </a:spcAft>
-              <a:buSzPts val="3600"/>
-              <a:buNone/>
-              <a:defRPr sz="3600"/>
-            </a:lvl6pPr>
-            <a:lvl7pPr lvl="6" algn="ctr">
-              <a:spcBef>
-                <a:spcPts val="0"/>
-              </a:spcBef>
-              <a:spcAft>
-                <a:spcPts val="0"/>
-              </a:spcAft>
-              <a:buSzPts val="3600"/>
-              <a:buNone/>
-              <a:defRPr sz="3600"/>
-            </a:lvl7pPr>
-            <a:lvl8pPr lvl="7" algn="ctr">
-              <a:spcBef>
-                <a:spcPts val="0"/>
-              </a:spcBef>
-              <a:spcAft>
-                <a:spcPts val="0"/>
-              </a:spcAft>
-              <a:buSzPts val="3600"/>
-              <a:buNone/>
-              <a:defRPr sz="3600"/>
-            </a:lvl8pPr>
-            <a:lvl9pPr lvl="8" algn="ctr">
-              <a:spcBef>
-                <a:spcPts val="0"/>
-              </a:spcBef>
-              <a:spcAft>
-                <a:spcPts val="0"/>
-              </a:spcAft>
-              <a:buSzPts val="3600"/>
-              <a:buNone/>
-              <a:defRPr sz="3600"/>
-            </a:lvl9pPr>
-          </a:lstStyle>
-          <a:p>
-            <a:r>
-              <a:rPr lang="en-US" dirty="0">
-                <a:latin typeface="Calibri" panose="020F0502020204030204" pitchFamily="34" charset="0"/>
-                <a:cs typeface="Calibri" panose="020F0502020204030204" pitchFamily="34" charset="0"/>
-              </a:rPr>
-              <a:t>Why is It </a:t>
-            </a:r>
-            <a:r>
-              <a:rPr lang="en-US" b="1" dirty="0">
-                <a:latin typeface="Calibri" panose="020F0502020204030204" pitchFamily="34" charset="0"/>
-                <a:cs typeface="Calibri" panose="020F0502020204030204" pitchFamily="34" charset="0"/>
-              </a:rPr>
-              <a:t>a problem</a:t>
-            </a:r>
-            <a:r>
-              <a:rPr lang="en-US" dirty="0">
-                <a:latin typeface="Calibri" panose="020F0502020204030204" pitchFamily="34" charset="0"/>
-                <a:cs typeface="Calibri" panose="020F0502020204030204" pitchFamily="34" charset="0"/>
-              </a:rPr>
-              <a:t>?</a:t>
-            </a:r>
-          </a:p>
-        </p:txBody>
-      </p:sp>
-      <p:pic>
-        <p:nvPicPr>
-          <p:cNvPr id="5" name="Picture 4">
-            <a:extLst>
-              <a:ext uri="{FF2B5EF4-FFF2-40B4-BE49-F238E27FC236}">
-                <a16:creationId xmlns:a16="http://schemas.microsoft.com/office/drawing/2014/main" id="{0B072DDD-7D1D-E810-ADF6-183189B75289}"/>
-              </a:ext>
-            </a:extLst>
-          </p:cNvPr>
-          <p:cNvPicPr>
-            <a:picLocks noChangeAspect="1"/>
-          </p:cNvPicPr>
-          <p:nvPr/>
-        </p:nvPicPr>
-        <p:blipFill>
-          <a:blip r:embed="rId2"/>
-          <a:stretch>
-            <a:fillRect/>
-          </a:stretch>
-        </p:blipFill>
-        <p:spPr>
-          <a:xfrm>
-            <a:off x="1567619" y="572700"/>
-            <a:ext cx="5346298" cy="4576431"/>
-          </a:xfrm>
-          <a:prstGeom prst="rect">
-            <a:avLst/>
-          </a:prstGeom>
-        </p:spPr>
-      </p:pic>
-    </p:spTree>
-    <p:extLst>
-      <p:ext uri="{BB962C8B-B14F-4D97-AF65-F5344CB8AC3E}">
-        <p14:creationId xmlns:p14="http://schemas.microsoft.com/office/powerpoint/2010/main" val="125542913"/>
-      </p:ext>
-    </p:extLst>
-  </p:cSld>
-  <p:clrMapOvr>
-    <a:masterClrMapping/>
-  </p:clrMapOvr>
-</p:sld>
-</file>
-
 <file path=ppt/slides/slide7.xml><?xml version="1.0" encoding="utf-8"?>
 <p:sld xmlns:a="http://schemas.openxmlformats.org/drawingml/2006/main" xmlns:r="http://schemas.openxmlformats.org/officeDocument/2006/relationships" xmlns:p="http://schemas.openxmlformats.org/presentationml/2006/main">
   <p:cSld>
@@ -8070,7 +8392,7 @@
           <p:cNvPr id="2" name="Title 1">
             <a:extLst>
               <a:ext uri="{FF2B5EF4-FFF2-40B4-BE49-F238E27FC236}">
-                <a16:creationId xmlns:a16="http://schemas.microsoft.com/office/drawing/2014/main" id="{203E8EEB-CC68-9AC1-165A-9B6F30EBD7CC}"/>
+                <a16:creationId xmlns:a16="http://schemas.microsoft.com/office/drawing/2014/main" id="{A3B58016-4C52-D983-FF1B-CC9D9066CD9B}"/>
               </a:ext>
             </a:extLst>
           </p:cNvPr>
@@ -8099,7 +8421,7 @@
                 <a:latin typeface="Calibri" panose="020F0502020204030204" pitchFamily="34" charset="0"/>
                 <a:cs typeface="Calibri" panose="020F0502020204030204" pitchFamily="34" charset="0"/>
               </a:rPr>
-              <a:t>Who Causes </a:t>
+              <a:t>WHY IS IT </a:t>
             </a:r>
             <a:r>
               <a:rPr lang="en-US" b="1" dirty="0">
@@ -8109,7 +8431,7 @@
                 <a:latin typeface="Calibri" panose="020F0502020204030204" pitchFamily="34" charset="0"/>
                 <a:cs typeface="Calibri" panose="020F0502020204030204" pitchFamily="34" charset="0"/>
               </a:rPr>
-              <a:t>Climate Change</a:t>
+              <a:t>A PROBLEM</a:t>
             </a:r>
             <a:r>
               <a:rPr lang="en-US" dirty="0">
@@ -8129,7 +8451,7 @@
           <p:cNvPr id="3" name="TextBox 2">
             <a:extLst>
               <a:ext uri="{FF2B5EF4-FFF2-40B4-BE49-F238E27FC236}">
-                <a16:creationId xmlns:a16="http://schemas.microsoft.com/office/drawing/2014/main" id="{7230E5A1-E0B8-34C1-BB0A-6B72CE05C953}"/>
+                <a16:creationId xmlns:a16="http://schemas.microsoft.com/office/drawing/2014/main" id="{2D0263E7-5935-7F4C-0895-873EB67EB98E}"/>
               </a:ext>
             </a:extLst>
           </p:cNvPr>
@@ -8138,8 +8460,8 @@
         </p:nvSpPr>
         <p:spPr>
           <a:xfrm>
-            <a:off x="179349" y="1553591"/>
-            <a:ext cx="3295787" cy="1815882"/>
+            <a:off x="743361" y="785815"/>
+            <a:ext cx="2237103" cy="2031325"/>
           </a:xfrm>
           <a:prstGeom prst="rect">
             <a:avLst/>
@@ -8153,21 +8475,108 @@
           <a:lstStyle/>
           <a:p>
             <a:r>
-              <a:rPr lang="en-US" sz="1600" dirty="0">
+              <a:rPr lang="en-US" sz="1400" dirty="0">
                 <a:latin typeface="Calibri" panose="020F0502020204030204" pitchFamily="34" charset="0"/>
                 <a:cs typeface="Calibri" panose="020F0502020204030204" pitchFamily="34" charset="0"/>
               </a:rPr>
-              <a:t>Around 1% of the greenhouse gases attributed to global warming are believed to have originated from the 50 least developed countries. In contrast, the contributions from the USA, the EU, and China alone account for approximately 60%.</a:t>
+              <a:t>Sea levels are rising as a result of increasing temperatures.</a:t>
+            </a:r>
+          </a:p>
+          <a:p>
+            <a:r>
+              <a:rPr lang="en-US" sz="1400" dirty="0">
+                <a:latin typeface="Calibri" panose="020F0502020204030204" pitchFamily="34" charset="0"/>
+                <a:cs typeface="Calibri" panose="020F0502020204030204" pitchFamily="34" charset="0"/>
+              </a:rPr>
+              <a:t>Over time, this can lead to high tides that flood coastal areas and destroy habitats thereby relocating entire communities living in flatlands/low-lying areas.</a:t>
+            </a:r>
+          </a:p>
+        </p:txBody>
+      </p:sp>
+      <p:sp>
+        <p:nvSpPr>
+          <p:cNvPr id="7" name="TextBox 6">
+            <a:extLst>
+              <a:ext uri="{FF2B5EF4-FFF2-40B4-BE49-F238E27FC236}">
+                <a16:creationId xmlns:a16="http://schemas.microsoft.com/office/drawing/2014/main" id="{AB4A8EC4-C565-6C23-0222-28AC74B867A7}"/>
+              </a:ext>
+            </a:extLst>
+          </p:cNvPr>
+          <p:cNvSpPr txBox="1"/>
+          <p:nvPr/>
+        </p:nvSpPr>
+        <p:spPr>
+          <a:xfrm>
+            <a:off x="743361" y="3783086"/>
+            <a:ext cx="7170475" cy="1015663"/>
+          </a:xfrm>
+          <a:prstGeom prst="rect">
+            <a:avLst/>
+          </a:prstGeom>
+          <a:noFill/>
+        </p:spPr>
+        <p:txBody>
+          <a:bodyPr wrap="square" rtlCol="0">
+            <a:spAutoFit/>
+          </a:bodyPr>
+          <a:lstStyle/>
+          <a:p>
+            <a:r>
+              <a:rPr lang="en-US" sz="1200" dirty="0">
+                <a:latin typeface="Calibri" panose="020F0502020204030204" pitchFamily="34" charset="0"/>
+                <a:cs typeface="Calibri" panose="020F0502020204030204" pitchFamily="34" charset="0"/>
+              </a:rPr>
+              <a:t>Rising sea levels are driven by two main processes:</a:t>
+            </a:r>
+          </a:p>
+          <a:p>
+            <a:pPr marL="171450" indent="-171450">
+              <a:buFont typeface="Arial" panose="020B0604020202020204" pitchFamily="34" charset="0"/>
+              <a:buChar char="•"/>
+            </a:pPr>
+            <a:r>
+              <a:rPr lang="en-US" sz="1200" b="1" u="sng" dirty="0">
+                <a:latin typeface="Calibri" panose="020F0502020204030204" pitchFamily="34" charset="0"/>
+                <a:cs typeface="Calibri" panose="020F0502020204030204" pitchFamily="34" charset="0"/>
+              </a:rPr>
+              <a:t>Ice Melt</a:t>
+            </a:r>
+            <a:r>
+              <a:rPr lang="en-US" sz="1200" dirty="0">
+                <a:latin typeface="Calibri" panose="020F0502020204030204" pitchFamily="34" charset="0"/>
+                <a:cs typeface="Calibri" panose="020F0502020204030204" pitchFamily="34" charset="0"/>
+              </a:rPr>
+              <a:t>: Warming up of air and sea leads to melting of the ice sheets and glaciers, consequently adding salt-less water into sea water.</a:t>
+            </a:r>
+          </a:p>
+          <a:p>
+            <a:pPr marL="171450" indent="-171450">
+              <a:buFont typeface="Arial" panose="020B0604020202020204" pitchFamily="34" charset="0"/>
+              <a:buChar char="•"/>
+            </a:pPr>
+            <a:r>
+              <a:rPr lang="en-US" sz="1200" b="1" u="sng" dirty="0">
+                <a:latin typeface="Calibri" panose="020F0502020204030204" pitchFamily="34" charset="0"/>
+                <a:cs typeface="Calibri" panose="020F0502020204030204" pitchFamily="34" charset="0"/>
+              </a:rPr>
+              <a:t>Thermal Expansion</a:t>
+            </a:r>
+            <a:r>
+              <a:rPr lang="en-US" sz="1200" dirty="0">
+                <a:latin typeface="Calibri" panose="020F0502020204030204" pitchFamily="34" charset="0"/>
+                <a:cs typeface="Calibri" panose="020F0502020204030204" pitchFamily="34" charset="0"/>
+              </a:rPr>
+              <a:t>: The increase in sea levels can be attributed to increasing temperatures of ocean water that causes it to expand.</a:t>
             </a:r>
           </a:p>
         </p:txBody>
       </p:sp>
       <p:pic>
         <p:nvPicPr>
-          <p:cNvPr id="5" name="Picture 4">
+          <p:cNvPr id="9" name="Picture 8">
             <a:extLst>
               <a:ext uri="{FF2B5EF4-FFF2-40B4-BE49-F238E27FC236}">
-                <a16:creationId xmlns:a16="http://schemas.microsoft.com/office/drawing/2014/main" id="{DCEE3AC7-4E5E-342E-546E-A44F911EFD86}"/>
+                <a16:creationId xmlns:a16="http://schemas.microsoft.com/office/drawing/2014/main" id="{E4FCB4C4-E0F2-77E5-AB68-3FEF310AB4AA}"/>
               </a:ext>
             </a:extLst>
           </p:cNvPr>
@@ -8184,8 +8593,8 @@
         </p:blipFill>
         <p:spPr>
           <a:xfrm>
-            <a:off x="3475136" y="711791"/>
-            <a:ext cx="4570268" cy="3852809"/>
+            <a:off x="3097994" y="785815"/>
+            <a:ext cx="4618049" cy="3053256"/>
           </a:xfrm>
           <a:prstGeom prst="rect">
             <a:avLst/>
@@ -8195,7 +8604,177 @@
     </p:spTree>
     <p:extLst>
       <p:ext uri="{BB962C8B-B14F-4D97-AF65-F5344CB8AC3E}">
-        <p14:creationId xmlns:p14="http://schemas.microsoft.com/office/powerpoint/2010/main" val="1975145425"/>
+        <p14:creationId xmlns:p14="http://schemas.microsoft.com/office/powerpoint/2010/main" val="3482042330"/>
+      </p:ext>
+    </p:extLst>
+  </p:cSld>
+  <p:clrMapOvr>
+    <a:masterClrMapping/>
+  </p:clrMapOvr>
+</p:sld>
+</file>
+
+<file path=ppt/slides/slide8.xml><?xml version="1.0" encoding="utf-8"?>
+<p:sld xmlns:a="http://schemas.openxmlformats.org/drawingml/2006/main" xmlns:r="http://schemas.openxmlformats.org/officeDocument/2006/relationships" xmlns:p="http://schemas.openxmlformats.org/presentationml/2006/main">
+  <p:cSld>
+    <p:spTree>
+      <p:nvGrpSpPr>
+        <p:cNvPr id="1" name=""/>
+        <p:cNvGrpSpPr/>
+        <p:nvPr/>
+      </p:nvGrpSpPr>
+      <p:grpSpPr>
+        <a:xfrm>
+          <a:off x="0" y="0"/>
+          <a:ext cx="0" cy="0"/>
+          <a:chOff x="0" y="0"/>
+          <a:chExt cx="0" cy="0"/>
+        </a:xfrm>
+      </p:grpSpPr>
+      <p:sp>
+        <p:nvSpPr>
+          <p:cNvPr id="2" name="Title 1">
+            <a:extLst>
+              <a:ext uri="{FF2B5EF4-FFF2-40B4-BE49-F238E27FC236}">
+                <a16:creationId xmlns:a16="http://schemas.microsoft.com/office/drawing/2014/main" id="{68D3E83E-4EDC-3214-C30C-F2561591F2DF}"/>
+              </a:ext>
+            </a:extLst>
+          </p:cNvPr>
+          <p:cNvSpPr>
+            <a:spLocks noGrp="1"/>
+          </p:cNvSpPr>
+          <p:nvPr>
+            <p:ph type="title"/>
+          </p:nvPr>
+        </p:nvSpPr>
+        <p:spPr/>
+        <p:txBody>
+          <a:bodyPr/>
+          <a:lstStyle/>
+          <a:p>
+            <a:endParaRPr lang="en-US"/>
+          </a:p>
+        </p:txBody>
+      </p:sp>
+      <p:pic>
+        <p:nvPicPr>
+          <p:cNvPr id="4" name="Picture 3">
+            <a:extLst>
+              <a:ext uri="{FF2B5EF4-FFF2-40B4-BE49-F238E27FC236}">
+                <a16:creationId xmlns:a16="http://schemas.microsoft.com/office/drawing/2014/main" id="{900B8C7B-8834-638A-5ED8-85679630FAB4}"/>
+              </a:ext>
+            </a:extLst>
+          </p:cNvPr>
+          <p:cNvPicPr>
+            <a:picLocks noChangeAspect="1"/>
+          </p:cNvPicPr>
+          <p:nvPr/>
+        </p:nvPicPr>
+        <p:blipFill>
+          <a:blip r:embed="rId2"/>
+          <a:stretch>
+            <a:fillRect/>
+          </a:stretch>
+        </p:blipFill>
+        <p:spPr>
+          <a:xfrm>
+            <a:off x="0" y="1455418"/>
+            <a:ext cx="9144000" cy="2232664"/>
+          </a:xfrm>
+          <a:prstGeom prst="rect">
+            <a:avLst/>
+          </a:prstGeom>
+        </p:spPr>
+      </p:pic>
+    </p:spTree>
+    <p:extLst>
+      <p:ext uri="{BB962C8B-B14F-4D97-AF65-F5344CB8AC3E}">
+        <p14:creationId xmlns:p14="http://schemas.microsoft.com/office/powerpoint/2010/main" val="4224203931"/>
+      </p:ext>
+    </p:extLst>
+  </p:cSld>
+  <p:clrMapOvr>
+    <a:masterClrMapping/>
+  </p:clrMapOvr>
+</p:sld>
+</file>
+
+<file path=ppt/slides/slide9.xml><?xml version="1.0" encoding="utf-8"?>
+<p:sld xmlns:a="http://schemas.openxmlformats.org/drawingml/2006/main" xmlns:r="http://schemas.openxmlformats.org/officeDocument/2006/relationships" xmlns:p="http://schemas.openxmlformats.org/presentationml/2006/main">
+  <p:cSld>
+    <p:spTree>
+      <p:nvGrpSpPr>
+        <p:cNvPr id="1" name=""/>
+        <p:cNvGrpSpPr/>
+        <p:nvPr/>
+      </p:nvGrpSpPr>
+      <p:grpSpPr>
+        <a:xfrm>
+          <a:off x="0" y="0"/>
+          <a:ext cx="0" cy="0"/>
+          <a:chOff x="0" y="0"/>
+          <a:chExt cx="0" cy="0"/>
+        </a:xfrm>
+      </p:grpSpPr>
+      <p:sp>
+        <p:nvSpPr>
+          <p:cNvPr id="2" name="Title 1">
+            <a:extLst>
+              <a:ext uri="{FF2B5EF4-FFF2-40B4-BE49-F238E27FC236}">
+                <a16:creationId xmlns:a16="http://schemas.microsoft.com/office/drawing/2014/main" id="{75EC2550-FB81-2DAE-2B93-520D7810B6D0}"/>
+              </a:ext>
+            </a:extLst>
+          </p:cNvPr>
+          <p:cNvSpPr>
+            <a:spLocks noGrp="1"/>
+          </p:cNvSpPr>
+          <p:nvPr>
+            <p:ph type="title"/>
+          </p:nvPr>
+        </p:nvSpPr>
+        <p:spPr/>
+        <p:txBody>
+          <a:bodyPr/>
+          <a:lstStyle/>
+          <a:p>
+            <a:endParaRPr lang="en-US" dirty="0"/>
+          </a:p>
+        </p:txBody>
+      </p:sp>
+      <p:pic>
+        <p:nvPicPr>
+          <p:cNvPr id="4" name="Picture 3">
+            <a:extLst>
+              <a:ext uri="{FF2B5EF4-FFF2-40B4-BE49-F238E27FC236}">
+                <a16:creationId xmlns:a16="http://schemas.microsoft.com/office/drawing/2014/main" id="{EF257D89-72C2-2C8C-20E6-B30C8E993ABD}"/>
+              </a:ext>
+            </a:extLst>
+          </p:cNvPr>
+          <p:cNvPicPr>
+            <a:picLocks noChangeAspect="1"/>
+          </p:cNvPicPr>
+          <p:nvPr/>
+        </p:nvPicPr>
+        <p:blipFill>
+          <a:blip r:embed="rId2"/>
+          <a:stretch>
+            <a:fillRect/>
+          </a:stretch>
+        </p:blipFill>
+        <p:spPr>
+          <a:xfrm>
+            <a:off x="938391" y="0"/>
+            <a:ext cx="1899401" cy="5143500"/>
+          </a:xfrm>
+          <a:prstGeom prst="rect">
+            <a:avLst/>
+          </a:prstGeom>
+        </p:spPr>
+      </p:pic>
+    </p:spTree>
+    <p:extLst>
+      <p:ext uri="{BB962C8B-B14F-4D97-AF65-F5344CB8AC3E}">
+        <p14:creationId xmlns:p14="http://schemas.microsoft.com/office/powerpoint/2010/main" val="3005924651"/>
       </p:ext>
     </p:extLst>
   </p:cSld>

</xml_diff>